<commit_message>
Commit as found in Feb 9 2020
</commit_message>
<xml_diff>
--- a/Fig_Factory.pptx
+++ b/Fig_Factory.pptx
@@ -11,11 +11,15 @@
     <p:sldId id="260" r:id="rId5"/>
     <p:sldId id="262" r:id="rId6"/>
     <p:sldId id="266" r:id="rId7"/>
-    <p:sldId id="256" r:id="rId8"/>
-    <p:sldId id="263" r:id="rId9"/>
-    <p:sldId id="264" r:id="rId10"/>
-    <p:sldId id="258" r:id="rId11"/>
-    <p:sldId id="259" r:id="rId12"/>
+    <p:sldId id="270" r:id="rId8"/>
+    <p:sldId id="256" r:id="rId9"/>
+    <p:sldId id="263" r:id="rId10"/>
+    <p:sldId id="264" r:id="rId11"/>
+    <p:sldId id="258" r:id="rId12"/>
+    <p:sldId id="259" r:id="rId13"/>
+    <p:sldId id="267" r:id="rId14"/>
+    <p:sldId id="268" r:id="rId15"/>
+    <p:sldId id="269" r:id="rId16"/>
   </p:sldIdLst>
   <p:sldSz cx="12192000" cy="6858000"/>
   <p:notesSz cx="6858000" cy="9144000"/>
@@ -3540,10 +3544,10 @@
       </p:grpSpPr>
       <p:pic>
         <p:nvPicPr>
-          <p:cNvPr id="4" name="Picture 3">
-            <a:extLst>
-              <a:ext uri="{FF2B5EF4-FFF2-40B4-BE49-F238E27FC236}">
-                <a16:creationId xmlns:a16="http://schemas.microsoft.com/office/drawing/2014/main" id="{6E91F7CF-D2A0-714C-80EC-61E7924CEAC8}"/>
+          <p:cNvPr id="10" name="Picture 9">
+            <a:extLst>
+              <a:ext uri="{FF2B5EF4-FFF2-40B4-BE49-F238E27FC236}">
+                <a16:creationId xmlns:a16="http://schemas.microsoft.com/office/drawing/2014/main" id="{2A1F3903-6E4A-9C4D-8CF9-295A9E76E80E}"/>
               </a:ext>
             </a:extLst>
           </p:cNvPr>
@@ -3552,261 +3556,28 @@
           </p:cNvPicPr>
           <p:nvPr/>
         </p:nvPicPr>
-        <p:blipFill rotWithShape="1">
+        <p:blipFill>
           <a:blip r:embed="rId2"/>
-          <a:srcRect l="35310" t="35385" r="57799" b="18461"/>
-          <a:stretch/>
+          <a:stretch>
+            <a:fillRect/>
+          </a:stretch>
         </p:blipFill>
         <p:spPr>
           <a:xfrm>
-            <a:off x="4589586" y="2426676"/>
-            <a:ext cx="756139" cy="3165287"/>
+            <a:off x="5542721" y="1091465"/>
+            <a:ext cx="3810000" cy="2540000"/>
           </a:xfrm>
           <a:prstGeom prst="rect">
             <a:avLst/>
           </a:prstGeom>
         </p:spPr>
       </p:pic>
-      <p:sp>
-        <p:nvSpPr>
-          <p:cNvPr id="5" name="TextBox 4">
-            <a:extLst>
-              <a:ext uri="{FF2B5EF4-FFF2-40B4-BE49-F238E27FC236}">
-                <a16:creationId xmlns:a16="http://schemas.microsoft.com/office/drawing/2014/main" id="{DB7B74EE-67F9-0C4F-BC2E-D2202E032CF0}"/>
-              </a:ext>
-            </a:extLst>
-          </p:cNvPr>
-          <p:cNvSpPr txBox="1"/>
-          <p:nvPr/>
-        </p:nvSpPr>
-        <p:spPr>
-          <a:xfrm>
-            <a:off x="5240215" y="2497015"/>
-            <a:ext cx="668773" cy="369332"/>
-          </a:xfrm>
-          <a:prstGeom prst="rect">
-            <a:avLst/>
-          </a:prstGeom>
-          <a:noFill/>
-        </p:spPr>
-        <p:txBody>
-          <a:bodyPr wrap="none" rtlCol="0">
-            <a:spAutoFit/>
-          </a:bodyPr>
-          <a:lstStyle/>
-          <a:p>
-            <a:r>
-              <a:rPr lang="en-US" dirty="0" err="1"/>
-              <a:t>Cul</a:t>
-            </a:r>
-            <a:r>
-              <a:rPr lang="en-US" dirty="0"/>
-              <a:t> A</a:t>
-            </a:r>
-          </a:p>
-        </p:txBody>
-      </p:sp>
-      <p:sp>
-        <p:nvSpPr>
-          <p:cNvPr id="7" name="TextBox 6">
-            <a:extLst>
-              <a:ext uri="{FF2B5EF4-FFF2-40B4-BE49-F238E27FC236}">
-                <a16:creationId xmlns:a16="http://schemas.microsoft.com/office/drawing/2014/main" id="{3B5EB9CC-A71E-4747-86E2-C6A951732A64}"/>
-              </a:ext>
-            </a:extLst>
-          </p:cNvPr>
-          <p:cNvSpPr txBox="1"/>
-          <p:nvPr/>
-        </p:nvSpPr>
-        <p:spPr>
-          <a:xfrm>
-            <a:off x="5240214" y="2965937"/>
-            <a:ext cx="668773" cy="369332"/>
-          </a:xfrm>
-          <a:prstGeom prst="rect">
-            <a:avLst/>
-          </a:prstGeom>
-          <a:noFill/>
-        </p:spPr>
-        <p:txBody>
-          <a:bodyPr wrap="none" rtlCol="0">
-            <a:spAutoFit/>
-          </a:bodyPr>
-          <a:lstStyle/>
-          <a:p>
-            <a:r>
-              <a:rPr lang="en-US" dirty="0" err="1"/>
-              <a:t>Cul</a:t>
-            </a:r>
-            <a:r>
-              <a:rPr lang="en-US" dirty="0"/>
-              <a:t> B</a:t>
-            </a:r>
-          </a:p>
-        </p:txBody>
-      </p:sp>
-      <p:sp>
-        <p:nvSpPr>
-          <p:cNvPr id="9" name="TextBox 8">
-            <a:extLst>
-              <a:ext uri="{FF2B5EF4-FFF2-40B4-BE49-F238E27FC236}">
-                <a16:creationId xmlns:a16="http://schemas.microsoft.com/office/drawing/2014/main" id="{C3B136EE-3D0E-B44B-8139-97F0927D8C4C}"/>
-              </a:ext>
-            </a:extLst>
-          </p:cNvPr>
-          <p:cNvSpPr txBox="1"/>
-          <p:nvPr/>
-        </p:nvSpPr>
-        <p:spPr>
-          <a:xfrm>
-            <a:off x="5240214" y="3464165"/>
-            <a:ext cx="668773" cy="369332"/>
-          </a:xfrm>
-          <a:prstGeom prst="rect">
-            <a:avLst/>
-          </a:prstGeom>
-          <a:noFill/>
-        </p:spPr>
-        <p:txBody>
-          <a:bodyPr wrap="none" rtlCol="0">
-            <a:spAutoFit/>
-          </a:bodyPr>
-          <a:lstStyle/>
-          <a:p>
-            <a:r>
-              <a:rPr lang="en-US" dirty="0" err="1"/>
-              <a:t>Cul</a:t>
-            </a:r>
-            <a:r>
-              <a:rPr lang="en-US" dirty="0"/>
-              <a:t> C</a:t>
-            </a:r>
-          </a:p>
-        </p:txBody>
-      </p:sp>
-      <p:sp>
-        <p:nvSpPr>
-          <p:cNvPr id="10" name="TextBox 9">
-            <a:extLst>
-              <a:ext uri="{FF2B5EF4-FFF2-40B4-BE49-F238E27FC236}">
-                <a16:creationId xmlns:a16="http://schemas.microsoft.com/office/drawing/2014/main" id="{3CF898F8-BD0E-2844-8084-456C7F1651CB}"/>
-              </a:ext>
-            </a:extLst>
-          </p:cNvPr>
-          <p:cNvSpPr txBox="1"/>
-          <p:nvPr/>
-        </p:nvSpPr>
-        <p:spPr>
-          <a:xfrm>
-            <a:off x="5240213" y="3962393"/>
-            <a:ext cx="678391" cy="369332"/>
-          </a:xfrm>
-          <a:prstGeom prst="rect">
-            <a:avLst/>
-          </a:prstGeom>
-          <a:noFill/>
-        </p:spPr>
-        <p:txBody>
-          <a:bodyPr wrap="none" rtlCol="0">
-            <a:spAutoFit/>
-          </a:bodyPr>
-          <a:lstStyle/>
-          <a:p>
-            <a:r>
-              <a:rPr lang="en-US" dirty="0" err="1"/>
-              <a:t>Cul</a:t>
-            </a:r>
-            <a:r>
-              <a:rPr lang="en-US" dirty="0"/>
-              <a:t> D</a:t>
-            </a:r>
-          </a:p>
-        </p:txBody>
-      </p:sp>
-      <p:sp>
-        <p:nvSpPr>
-          <p:cNvPr id="11" name="TextBox 10">
-            <a:extLst>
-              <a:ext uri="{FF2B5EF4-FFF2-40B4-BE49-F238E27FC236}">
-                <a16:creationId xmlns:a16="http://schemas.microsoft.com/office/drawing/2014/main" id="{20A4ED6F-4C19-E44C-ABA3-7803018E7C41}"/>
-              </a:ext>
-            </a:extLst>
-          </p:cNvPr>
-          <p:cNvSpPr txBox="1"/>
-          <p:nvPr/>
-        </p:nvSpPr>
-        <p:spPr>
-          <a:xfrm>
-            <a:off x="5240212" y="4460621"/>
-            <a:ext cx="668773" cy="369332"/>
-          </a:xfrm>
-          <a:prstGeom prst="rect">
-            <a:avLst/>
-          </a:prstGeom>
-          <a:noFill/>
-        </p:spPr>
-        <p:txBody>
-          <a:bodyPr wrap="none" rtlCol="0">
-            <a:spAutoFit/>
-          </a:bodyPr>
-          <a:lstStyle/>
-          <a:p>
-            <a:r>
-              <a:rPr lang="en-US" dirty="0" err="1"/>
-              <a:t>Cul</a:t>
-            </a:r>
-            <a:r>
-              <a:rPr lang="en-US" dirty="0"/>
-              <a:t> E</a:t>
-            </a:r>
-          </a:p>
-        </p:txBody>
-      </p:sp>
-      <p:sp>
-        <p:nvSpPr>
-          <p:cNvPr id="12" name="TextBox 11">
-            <a:extLst>
-              <a:ext uri="{FF2B5EF4-FFF2-40B4-BE49-F238E27FC236}">
-                <a16:creationId xmlns:a16="http://schemas.microsoft.com/office/drawing/2014/main" id="{2C9F4285-7262-EB46-ADEC-5EC17AB45EF0}"/>
-              </a:ext>
-            </a:extLst>
-          </p:cNvPr>
-          <p:cNvSpPr txBox="1"/>
-          <p:nvPr/>
-        </p:nvSpPr>
-        <p:spPr>
-          <a:xfrm>
-            <a:off x="5240211" y="4958849"/>
-            <a:ext cx="875561" cy="369332"/>
-          </a:xfrm>
-          <a:prstGeom prst="rect">
-            <a:avLst/>
-          </a:prstGeom>
-          <a:noFill/>
-        </p:spPr>
-        <p:txBody>
-          <a:bodyPr wrap="none" rtlCol="0">
-            <a:spAutoFit/>
-          </a:bodyPr>
-          <a:lstStyle/>
-          <a:p>
-            <a:r>
-              <a:rPr lang="en-US" dirty="0" err="1"/>
-              <a:t>Cul</a:t>
-            </a:r>
-            <a:r>
-              <a:rPr lang="en-US" dirty="0"/>
-              <a:t> F01</a:t>
-            </a:r>
-          </a:p>
-        </p:txBody>
-      </p:sp>
       <p:pic>
         <p:nvPicPr>
-          <p:cNvPr id="14" name="Picture 13">
-            <a:extLst>
-              <a:ext uri="{FF2B5EF4-FFF2-40B4-BE49-F238E27FC236}">
-                <a16:creationId xmlns:a16="http://schemas.microsoft.com/office/drawing/2014/main" id="{4A4226F2-EBB9-4D48-8CC4-31CC563F0CCC}"/>
+          <p:cNvPr id="11" name="Picture 10">
+            <a:extLst>
+              <a:ext uri="{FF2B5EF4-FFF2-40B4-BE49-F238E27FC236}">
+                <a16:creationId xmlns:a16="http://schemas.microsoft.com/office/drawing/2014/main" id="{B3A84661-69BE-3146-ADC6-2D68D218EC82}"/>
               </a:ext>
             </a:extLst>
           </p:cNvPr>
@@ -3823,8 +3594,8 @@
         </p:blipFill>
         <p:spPr>
           <a:xfrm>
-            <a:off x="7295661" y="1566496"/>
-            <a:ext cx="1574800" cy="3162300"/>
+            <a:off x="5559654" y="3665331"/>
+            <a:ext cx="3810000" cy="2540000"/>
           </a:xfrm>
           <a:prstGeom prst="rect">
             <a:avLst/>
@@ -3833,10 +3604,10 @@
       </p:pic>
       <p:pic>
         <p:nvPicPr>
-          <p:cNvPr id="15" name="Picture 14">
-            <a:extLst>
-              <a:ext uri="{FF2B5EF4-FFF2-40B4-BE49-F238E27FC236}">
-                <a16:creationId xmlns:a16="http://schemas.microsoft.com/office/drawing/2014/main" id="{91D15FCC-CE2A-6946-86BB-CAFFF1787F97}"/>
+          <p:cNvPr id="12" name="Picture 11">
+            <a:extLst>
+              <a:ext uri="{FF2B5EF4-FFF2-40B4-BE49-F238E27FC236}">
+                <a16:creationId xmlns:a16="http://schemas.microsoft.com/office/drawing/2014/main" id="{3D973950-F24B-404C-BED8-84B0FC0FB089}"/>
               </a:ext>
             </a:extLst>
           </p:cNvPr>
@@ -3845,27 +3616,58 @@
           </p:cNvPicPr>
           <p:nvPr/>
         </p:nvPicPr>
-        <p:blipFill rotWithShape="1">
-          <a:blip r:embed="rId2"/>
-          <a:srcRect l="35310" t="35385" r="57799" b="18461"/>
-          <a:stretch/>
+        <p:blipFill>
+          <a:blip r:embed="rId4"/>
+          <a:stretch>
+            <a:fillRect/>
+          </a:stretch>
         </p:blipFill>
         <p:spPr>
           <a:xfrm>
-            <a:off x="1846387" y="1450703"/>
-            <a:ext cx="294062" cy="1230978"/>
+            <a:off x="1732721" y="3635328"/>
+            <a:ext cx="3810000" cy="2540000"/>
           </a:xfrm>
           <a:prstGeom prst="rect">
             <a:avLst/>
           </a:prstGeom>
         </p:spPr>
       </p:pic>
+      <p:pic>
+        <p:nvPicPr>
+          <p:cNvPr id="13" name="Picture 12">
+            <a:extLst>
+              <a:ext uri="{FF2B5EF4-FFF2-40B4-BE49-F238E27FC236}">
+                <a16:creationId xmlns:a16="http://schemas.microsoft.com/office/drawing/2014/main" id="{5F162585-E005-BF42-9400-AA9C3C65C150}"/>
+              </a:ext>
+            </a:extLst>
+          </p:cNvPr>
+          <p:cNvPicPr>
+            <a:picLocks noChangeAspect="1"/>
+          </p:cNvPicPr>
+          <p:nvPr/>
+        </p:nvPicPr>
+        <p:blipFill>
+          <a:blip r:embed="rId5"/>
+          <a:stretch>
+            <a:fillRect/>
+          </a:stretch>
+        </p:blipFill>
+        <p:spPr>
+          <a:xfrm>
+            <a:off x="1732721" y="1108398"/>
+            <a:ext cx="3810000" cy="2540000"/>
+          </a:xfrm>
+          <a:prstGeom prst="rect">
+            <a:avLst/>
+          </a:prstGeom>
+        </p:spPr>
+      </p:pic>
       <p:sp>
         <p:nvSpPr>
           <p:cNvPr id="16" name="TextBox 15">
             <a:extLst>
               <a:ext uri="{FF2B5EF4-FFF2-40B4-BE49-F238E27FC236}">
-                <a16:creationId xmlns:a16="http://schemas.microsoft.com/office/drawing/2014/main" id="{F81FFFFC-8831-3D48-8707-83925DF151E7}"/>
+                <a16:creationId xmlns:a16="http://schemas.microsoft.com/office/drawing/2014/main" id="{DFF062F2-362F-B74D-A74F-8E8B30C65CCB}"/>
               </a:ext>
             </a:extLst>
           </p:cNvPr>
@@ -3874,8 +3676,8 @@
         </p:nvSpPr>
         <p:spPr>
           <a:xfrm>
-            <a:off x="2076993" y="1424579"/>
-            <a:ext cx="413896" cy="230832"/>
+            <a:off x="3228700" y="800621"/>
+            <a:ext cx="818044" cy="307777"/>
           </a:xfrm>
           <a:prstGeom prst="rect">
             <a:avLst/>
@@ -3889,22 +3691,18 @@
           <a:lstStyle/>
           <a:p>
             <a:r>
-              <a:rPr lang="en-US" sz="900" dirty="0" err="1"/>
-              <a:t>cul</a:t>
-            </a:r>
-            <a:r>
-              <a:rPr lang="en-US" sz="900" dirty="0"/>
-              <a:t> A</a:t>
-            </a:r>
-          </a:p>
-        </p:txBody>
-      </p:sp>
-      <p:sp>
-        <p:nvSpPr>
-          <p:cNvPr id="17" name="TextBox 16">
-            <a:extLst>
-              <a:ext uri="{FF2B5EF4-FFF2-40B4-BE49-F238E27FC236}">
-                <a16:creationId xmlns:a16="http://schemas.microsoft.com/office/drawing/2014/main" id="{EB2A3BD1-13CD-D14B-8CCC-BEE05D877746}"/>
+              <a:rPr lang="en-US" sz="1400" dirty="0"/>
+              <a:t>Recon3d</a:t>
+            </a:r>
+          </a:p>
+        </p:txBody>
+      </p:sp>
+      <p:sp>
+        <p:nvSpPr>
+          <p:cNvPr id="18" name="TextBox 17">
+            <a:extLst>
+              <a:ext uri="{FF2B5EF4-FFF2-40B4-BE49-F238E27FC236}">
+                <a16:creationId xmlns:a16="http://schemas.microsoft.com/office/drawing/2014/main" id="{18951DFB-A4DE-B14E-ABBE-8325B7DBD00F}"/>
               </a:ext>
             </a:extLst>
           </p:cNvPr>
@@ -3913,8 +3711,8 @@
         </p:nvSpPr>
         <p:spPr>
           <a:xfrm>
-            <a:off x="2076993" y="1618746"/>
-            <a:ext cx="413896" cy="230832"/>
+            <a:off x="7191882" y="800621"/>
+            <a:ext cx="511679" cy="307777"/>
           </a:xfrm>
           <a:prstGeom prst="rect">
             <a:avLst/>
@@ -3928,22 +3726,18 @@
           <a:lstStyle/>
           <a:p>
             <a:r>
-              <a:rPr lang="en-US" sz="900" dirty="0" err="1"/>
-              <a:t>cul</a:t>
-            </a:r>
-            <a:r>
-              <a:rPr lang="en-US" sz="900" dirty="0"/>
-              <a:t> B</a:t>
-            </a:r>
-          </a:p>
-        </p:txBody>
-      </p:sp>
-      <p:sp>
-        <p:nvSpPr>
-          <p:cNvPr id="18" name="TextBox 17">
-            <a:extLst>
-              <a:ext uri="{FF2B5EF4-FFF2-40B4-BE49-F238E27FC236}">
-                <a16:creationId xmlns:a16="http://schemas.microsoft.com/office/drawing/2014/main" id="{C464B865-55F7-D543-A3D9-E8E1AA6B9F87}"/>
+              <a:rPr lang="en-US" sz="1400" dirty="0"/>
+              <a:t>CHO</a:t>
+            </a:r>
+          </a:p>
+        </p:txBody>
+      </p:sp>
+      <p:sp>
+        <p:nvSpPr>
+          <p:cNvPr id="20" name="TextBox 19">
+            <a:extLst>
+              <a:ext uri="{FF2B5EF4-FFF2-40B4-BE49-F238E27FC236}">
+                <a16:creationId xmlns:a16="http://schemas.microsoft.com/office/drawing/2014/main" id="{991F63BB-9B93-6643-BD59-272166CC41B7}"/>
               </a:ext>
             </a:extLst>
           </p:cNvPr>
@@ -3952,8 +3746,8 @@
         </p:nvSpPr>
         <p:spPr>
           <a:xfrm>
-            <a:off x="2076993" y="1799851"/>
-            <a:ext cx="413896" cy="230832"/>
+            <a:off x="2001456" y="1206133"/>
+            <a:ext cx="365806" cy="307777"/>
           </a:xfrm>
           <a:prstGeom prst="rect">
             <a:avLst/>
@@ -3967,22 +3761,18 @@
           <a:lstStyle/>
           <a:p>
             <a:r>
-              <a:rPr lang="en-US" sz="900" dirty="0" err="1"/>
-              <a:t>cul</a:t>
-            </a:r>
-            <a:r>
-              <a:rPr lang="en-US" sz="900" dirty="0"/>
-              <a:t> C</a:t>
-            </a:r>
-          </a:p>
-        </p:txBody>
-      </p:sp>
-      <p:sp>
-        <p:nvSpPr>
-          <p:cNvPr id="19" name="TextBox 18">
-            <a:extLst>
-              <a:ext uri="{FF2B5EF4-FFF2-40B4-BE49-F238E27FC236}">
-                <a16:creationId xmlns:a16="http://schemas.microsoft.com/office/drawing/2014/main" id="{CBF1EF8E-E632-384F-A37A-F06B12416F5C}"/>
+              <a:rPr lang="en-US" sz="1400" dirty="0"/>
+              <a:t>EP</a:t>
+            </a:r>
+          </a:p>
+        </p:txBody>
+      </p:sp>
+      <p:sp>
+        <p:nvSpPr>
+          <p:cNvPr id="22" name="TextBox 21">
+            <a:extLst>
+              <a:ext uri="{FF2B5EF4-FFF2-40B4-BE49-F238E27FC236}">
+                <a16:creationId xmlns:a16="http://schemas.microsoft.com/office/drawing/2014/main" id="{D17CA325-3D88-6544-8392-BB608424D804}"/>
               </a:ext>
             </a:extLst>
           </p:cNvPr>
@@ -3991,8 +3781,8 @@
         </p:nvSpPr>
         <p:spPr>
           <a:xfrm>
-            <a:off x="2076993" y="2002482"/>
-            <a:ext cx="413896" cy="230832"/>
+            <a:off x="1951395" y="3746133"/>
+            <a:ext cx="466666" cy="307777"/>
           </a:xfrm>
           <a:prstGeom prst="rect">
             <a:avLst/>
@@ -4006,22 +3796,18 @@
           <a:lstStyle/>
           <a:p>
             <a:r>
-              <a:rPr lang="en-US" sz="900" dirty="0" err="1"/>
-              <a:t>cul</a:t>
-            </a:r>
-            <a:r>
-              <a:rPr lang="en-US" sz="900" dirty="0"/>
-              <a:t> D</a:t>
-            </a:r>
-          </a:p>
-        </p:txBody>
-      </p:sp>
-      <p:sp>
-        <p:nvSpPr>
-          <p:cNvPr id="20" name="TextBox 19">
-            <a:extLst>
-              <a:ext uri="{FF2B5EF4-FFF2-40B4-BE49-F238E27FC236}">
-                <a16:creationId xmlns:a16="http://schemas.microsoft.com/office/drawing/2014/main" id="{5A43AC8F-674F-0F43-AB32-A5D1288FADDA}"/>
+              <a:rPr lang="en-US" sz="1400" dirty="0"/>
+              <a:t>FBA</a:t>
+            </a:r>
+          </a:p>
+        </p:txBody>
+      </p:sp>
+      <p:sp>
+        <p:nvSpPr>
+          <p:cNvPr id="24" name="TextBox 23">
+            <a:extLst>
+              <a:ext uri="{FF2B5EF4-FFF2-40B4-BE49-F238E27FC236}">
+                <a16:creationId xmlns:a16="http://schemas.microsoft.com/office/drawing/2014/main" id="{519026D8-7EBC-5049-B81B-882B55602753}"/>
               </a:ext>
             </a:extLst>
           </p:cNvPr>
@@ -4030,8 +3816,8 @@
         </p:nvSpPr>
         <p:spPr>
           <a:xfrm>
-            <a:off x="2076993" y="2198091"/>
-            <a:ext cx="413896" cy="230832"/>
+            <a:off x="5862256" y="1189200"/>
+            <a:ext cx="365806" cy="307777"/>
           </a:xfrm>
           <a:prstGeom prst="rect">
             <a:avLst/>
@@ -4045,22 +3831,18 @@
           <a:lstStyle/>
           <a:p>
             <a:r>
-              <a:rPr lang="en-US" sz="900" dirty="0" err="1"/>
-              <a:t>cul</a:t>
-            </a:r>
-            <a:r>
-              <a:rPr lang="en-US" sz="900" dirty="0"/>
-              <a:t> E</a:t>
-            </a:r>
-          </a:p>
-        </p:txBody>
-      </p:sp>
-      <p:sp>
-        <p:nvSpPr>
-          <p:cNvPr id="21" name="TextBox 20">
-            <a:extLst>
-              <a:ext uri="{FF2B5EF4-FFF2-40B4-BE49-F238E27FC236}">
-                <a16:creationId xmlns:a16="http://schemas.microsoft.com/office/drawing/2014/main" id="{52313D8F-8773-FD4D-A085-CF80D419D97D}"/>
+              <a:rPr lang="en-US" sz="1400" dirty="0"/>
+              <a:t>EP</a:t>
+            </a:r>
+          </a:p>
+        </p:txBody>
+      </p:sp>
+      <p:sp>
+        <p:nvSpPr>
+          <p:cNvPr id="25" name="TextBox 24">
+            <a:extLst>
+              <a:ext uri="{FF2B5EF4-FFF2-40B4-BE49-F238E27FC236}">
+                <a16:creationId xmlns:a16="http://schemas.microsoft.com/office/drawing/2014/main" id="{373A200C-0F88-5F4C-AC8A-E48AC14DE0E2}"/>
               </a:ext>
             </a:extLst>
           </p:cNvPr>
@@ -4069,8 +3851,8 @@
         </p:nvSpPr>
         <p:spPr>
           <a:xfrm>
-            <a:off x="2076993" y="2381599"/>
-            <a:ext cx="514885" cy="230832"/>
+            <a:off x="5862256" y="3746133"/>
+            <a:ext cx="466666" cy="307777"/>
           </a:xfrm>
           <a:prstGeom prst="rect">
             <a:avLst/>
@@ -4084,12 +3866,78 @@
           <a:lstStyle/>
           <a:p>
             <a:r>
-              <a:rPr lang="en-US" sz="900" dirty="0" err="1"/>
-              <a:t>cul</a:t>
-            </a:r>
-            <a:r>
-              <a:rPr lang="en-US" sz="900" dirty="0"/>
-              <a:t> F01</a:t>
+              <a:rPr lang="en-US" sz="1400" dirty="0"/>
+              <a:t>FBA</a:t>
+            </a:r>
+          </a:p>
+        </p:txBody>
+      </p:sp>
+      <p:sp>
+        <p:nvSpPr>
+          <p:cNvPr id="26" name="TextBox 25">
+            <a:extLst>
+              <a:ext uri="{FF2B5EF4-FFF2-40B4-BE49-F238E27FC236}">
+                <a16:creationId xmlns:a16="http://schemas.microsoft.com/office/drawing/2014/main" id="{2822D5A9-DAB1-D641-803E-E408146D863A}"/>
+              </a:ext>
+            </a:extLst>
+          </p:cNvPr>
+          <p:cNvSpPr txBox="1"/>
+          <p:nvPr/>
+        </p:nvSpPr>
+        <p:spPr>
+          <a:xfrm rot="16200000">
+            <a:off x="1204704" y="3262667"/>
+            <a:ext cx="659155" cy="307777"/>
+          </a:xfrm>
+          <a:prstGeom prst="rect">
+            <a:avLst/>
+          </a:prstGeom>
+          <a:noFill/>
+        </p:spPr>
+        <p:txBody>
+          <a:bodyPr wrap="none" rtlCol="0">
+            <a:spAutoFit/>
+          </a:bodyPr>
+          <a:lstStyle/>
+          <a:p>
+            <a:r>
+              <a:rPr lang="en-US" sz="1400" dirty="0"/>
+              <a:t>Model</a:t>
+            </a:r>
+          </a:p>
+        </p:txBody>
+      </p:sp>
+      <p:sp>
+        <p:nvSpPr>
+          <p:cNvPr id="27" name="TextBox 26">
+            <a:extLst>
+              <a:ext uri="{FF2B5EF4-FFF2-40B4-BE49-F238E27FC236}">
+                <a16:creationId xmlns:a16="http://schemas.microsoft.com/office/drawing/2014/main" id="{F1117BAC-3381-C844-90E8-7DECE36A2C0D}"/>
+              </a:ext>
+            </a:extLst>
+          </p:cNvPr>
+          <p:cNvSpPr txBox="1"/>
+          <p:nvPr/>
+        </p:nvSpPr>
+        <p:spPr>
+          <a:xfrm>
+            <a:off x="4836078" y="6175328"/>
+            <a:ext cx="1026178" cy="307777"/>
+          </a:xfrm>
+          <a:prstGeom prst="rect">
+            <a:avLst/>
+          </a:prstGeom>
+          <a:noFill/>
+        </p:spPr>
+        <p:txBody>
+          <a:bodyPr wrap="none" rtlCol="0">
+            <a:spAutoFit/>
+          </a:bodyPr>
+          <a:lstStyle/>
+          <a:p>
+            <a:r>
+              <a:rPr lang="en-US" sz="1400" dirty="0"/>
+              <a:t>Experiment</a:t>
             </a:r>
           </a:p>
         </p:txBody>
@@ -4097,7 +3945,7 @@
     </p:spTree>
     <p:extLst>
       <p:ext uri="{BB962C8B-B14F-4D97-AF65-F5344CB8AC3E}">
-        <p14:creationId xmlns:p14="http://schemas.microsoft.com/office/powerpoint/2010/main" val="3419653359"/>
+        <p14:creationId xmlns:p14="http://schemas.microsoft.com/office/powerpoint/2010/main" val="3874926511"/>
       </p:ext>
     </p:extLst>
   </p:cSld>
@@ -4124,10 +3972,860 @@
           <a:chExt cx="0" cy="0"/>
         </a:xfrm>
       </p:grpSpPr>
+      <p:pic>
+        <p:nvPicPr>
+          <p:cNvPr id="4" name="Picture 3">
+            <a:extLst>
+              <a:ext uri="{FF2B5EF4-FFF2-40B4-BE49-F238E27FC236}">
+                <a16:creationId xmlns:a16="http://schemas.microsoft.com/office/drawing/2014/main" id="{6E91F7CF-D2A0-714C-80EC-61E7924CEAC8}"/>
+              </a:ext>
+            </a:extLst>
+          </p:cNvPr>
+          <p:cNvPicPr>
+            <a:picLocks noChangeAspect="1"/>
+          </p:cNvPicPr>
+          <p:nvPr/>
+        </p:nvPicPr>
+        <p:blipFill rotWithShape="1">
+          <a:blip r:embed="rId2"/>
+          <a:srcRect l="35310" t="35385" r="57799" b="18461"/>
+          <a:stretch/>
+        </p:blipFill>
+        <p:spPr>
+          <a:xfrm>
+            <a:off x="4589586" y="2426676"/>
+            <a:ext cx="756139" cy="3165287"/>
+          </a:xfrm>
+          <a:prstGeom prst="rect">
+            <a:avLst/>
+          </a:prstGeom>
+        </p:spPr>
+      </p:pic>
+      <p:sp>
+        <p:nvSpPr>
+          <p:cNvPr id="5" name="TextBox 4">
+            <a:extLst>
+              <a:ext uri="{FF2B5EF4-FFF2-40B4-BE49-F238E27FC236}">
+                <a16:creationId xmlns:a16="http://schemas.microsoft.com/office/drawing/2014/main" id="{DB7B74EE-67F9-0C4F-BC2E-D2202E032CF0}"/>
+              </a:ext>
+            </a:extLst>
+          </p:cNvPr>
+          <p:cNvSpPr txBox="1"/>
+          <p:nvPr/>
+        </p:nvSpPr>
+        <p:spPr>
+          <a:xfrm>
+            <a:off x="5240215" y="2497015"/>
+            <a:ext cx="668773" cy="369332"/>
+          </a:xfrm>
+          <a:prstGeom prst="rect">
+            <a:avLst/>
+          </a:prstGeom>
+          <a:noFill/>
+        </p:spPr>
+        <p:txBody>
+          <a:bodyPr wrap="none" rtlCol="0">
+            <a:spAutoFit/>
+          </a:bodyPr>
+          <a:lstStyle/>
+          <a:p>
+            <a:r>
+              <a:rPr lang="en-US" dirty="0" err="1"/>
+              <a:t>Cul</a:t>
+            </a:r>
+            <a:r>
+              <a:rPr lang="en-US" dirty="0"/>
+              <a:t> A</a:t>
+            </a:r>
+          </a:p>
+        </p:txBody>
+      </p:sp>
+      <p:sp>
+        <p:nvSpPr>
+          <p:cNvPr id="7" name="TextBox 6">
+            <a:extLst>
+              <a:ext uri="{FF2B5EF4-FFF2-40B4-BE49-F238E27FC236}">
+                <a16:creationId xmlns:a16="http://schemas.microsoft.com/office/drawing/2014/main" id="{3B5EB9CC-A71E-4747-86E2-C6A951732A64}"/>
+              </a:ext>
+            </a:extLst>
+          </p:cNvPr>
+          <p:cNvSpPr txBox="1"/>
+          <p:nvPr/>
+        </p:nvSpPr>
+        <p:spPr>
+          <a:xfrm>
+            <a:off x="5240214" y="2965937"/>
+            <a:ext cx="668773" cy="369332"/>
+          </a:xfrm>
+          <a:prstGeom prst="rect">
+            <a:avLst/>
+          </a:prstGeom>
+          <a:noFill/>
+        </p:spPr>
+        <p:txBody>
+          <a:bodyPr wrap="none" rtlCol="0">
+            <a:spAutoFit/>
+          </a:bodyPr>
+          <a:lstStyle/>
+          <a:p>
+            <a:r>
+              <a:rPr lang="en-US" dirty="0" err="1"/>
+              <a:t>Cul</a:t>
+            </a:r>
+            <a:r>
+              <a:rPr lang="en-US" dirty="0"/>
+              <a:t> B</a:t>
+            </a:r>
+          </a:p>
+        </p:txBody>
+      </p:sp>
+      <p:sp>
+        <p:nvSpPr>
+          <p:cNvPr id="9" name="TextBox 8">
+            <a:extLst>
+              <a:ext uri="{FF2B5EF4-FFF2-40B4-BE49-F238E27FC236}">
+                <a16:creationId xmlns:a16="http://schemas.microsoft.com/office/drawing/2014/main" id="{C3B136EE-3D0E-B44B-8139-97F0927D8C4C}"/>
+              </a:ext>
+            </a:extLst>
+          </p:cNvPr>
+          <p:cNvSpPr txBox="1"/>
+          <p:nvPr/>
+        </p:nvSpPr>
+        <p:spPr>
+          <a:xfrm>
+            <a:off x="5240214" y="3464165"/>
+            <a:ext cx="668773" cy="369332"/>
+          </a:xfrm>
+          <a:prstGeom prst="rect">
+            <a:avLst/>
+          </a:prstGeom>
+          <a:noFill/>
+        </p:spPr>
+        <p:txBody>
+          <a:bodyPr wrap="none" rtlCol="0">
+            <a:spAutoFit/>
+          </a:bodyPr>
+          <a:lstStyle/>
+          <a:p>
+            <a:r>
+              <a:rPr lang="en-US" dirty="0" err="1"/>
+              <a:t>Cul</a:t>
+            </a:r>
+            <a:r>
+              <a:rPr lang="en-US" dirty="0"/>
+              <a:t> C</a:t>
+            </a:r>
+          </a:p>
+        </p:txBody>
+      </p:sp>
+      <p:sp>
+        <p:nvSpPr>
+          <p:cNvPr id="10" name="TextBox 9">
+            <a:extLst>
+              <a:ext uri="{FF2B5EF4-FFF2-40B4-BE49-F238E27FC236}">
+                <a16:creationId xmlns:a16="http://schemas.microsoft.com/office/drawing/2014/main" id="{3CF898F8-BD0E-2844-8084-456C7F1651CB}"/>
+              </a:ext>
+            </a:extLst>
+          </p:cNvPr>
+          <p:cNvSpPr txBox="1"/>
+          <p:nvPr/>
+        </p:nvSpPr>
+        <p:spPr>
+          <a:xfrm>
+            <a:off x="5240213" y="3962393"/>
+            <a:ext cx="678391" cy="369332"/>
+          </a:xfrm>
+          <a:prstGeom prst="rect">
+            <a:avLst/>
+          </a:prstGeom>
+          <a:noFill/>
+        </p:spPr>
+        <p:txBody>
+          <a:bodyPr wrap="none" rtlCol="0">
+            <a:spAutoFit/>
+          </a:bodyPr>
+          <a:lstStyle/>
+          <a:p>
+            <a:r>
+              <a:rPr lang="en-US" dirty="0" err="1"/>
+              <a:t>Cul</a:t>
+            </a:r>
+            <a:r>
+              <a:rPr lang="en-US" dirty="0"/>
+              <a:t> D</a:t>
+            </a:r>
+          </a:p>
+        </p:txBody>
+      </p:sp>
+      <p:sp>
+        <p:nvSpPr>
+          <p:cNvPr id="11" name="TextBox 10">
+            <a:extLst>
+              <a:ext uri="{FF2B5EF4-FFF2-40B4-BE49-F238E27FC236}">
+                <a16:creationId xmlns:a16="http://schemas.microsoft.com/office/drawing/2014/main" id="{20A4ED6F-4C19-E44C-ABA3-7803018E7C41}"/>
+              </a:ext>
+            </a:extLst>
+          </p:cNvPr>
+          <p:cNvSpPr txBox="1"/>
+          <p:nvPr/>
+        </p:nvSpPr>
+        <p:spPr>
+          <a:xfrm>
+            <a:off x="5240212" y="4460621"/>
+            <a:ext cx="668773" cy="369332"/>
+          </a:xfrm>
+          <a:prstGeom prst="rect">
+            <a:avLst/>
+          </a:prstGeom>
+          <a:noFill/>
+        </p:spPr>
+        <p:txBody>
+          <a:bodyPr wrap="none" rtlCol="0">
+            <a:spAutoFit/>
+          </a:bodyPr>
+          <a:lstStyle/>
+          <a:p>
+            <a:r>
+              <a:rPr lang="en-US" dirty="0" err="1"/>
+              <a:t>Cul</a:t>
+            </a:r>
+            <a:r>
+              <a:rPr lang="en-US" dirty="0"/>
+              <a:t> E</a:t>
+            </a:r>
+          </a:p>
+        </p:txBody>
+      </p:sp>
+      <p:sp>
+        <p:nvSpPr>
+          <p:cNvPr id="12" name="TextBox 11">
+            <a:extLst>
+              <a:ext uri="{FF2B5EF4-FFF2-40B4-BE49-F238E27FC236}">
+                <a16:creationId xmlns:a16="http://schemas.microsoft.com/office/drawing/2014/main" id="{2C9F4285-7262-EB46-ADEC-5EC17AB45EF0}"/>
+              </a:ext>
+            </a:extLst>
+          </p:cNvPr>
+          <p:cNvSpPr txBox="1"/>
+          <p:nvPr/>
+        </p:nvSpPr>
+        <p:spPr>
+          <a:xfrm>
+            <a:off x="5240211" y="4958849"/>
+            <a:ext cx="875561" cy="369332"/>
+          </a:xfrm>
+          <a:prstGeom prst="rect">
+            <a:avLst/>
+          </a:prstGeom>
+          <a:noFill/>
+        </p:spPr>
+        <p:txBody>
+          <a:bodyPr wrap="none" rtlCol="0">
+            <a:spAutoFit/>
+          </a:bodyPr>
+          <a:lstStyle/>
+          <a:p>
+            <a:r>
+              <a:rPr lang="en-US" dirty="0" err="1"/>
+              <a:t>Cul</a:t>
+            </a:r>
+            <a:r>
+              <a:rPr lang="en-US" dirty="0"/>
+              <a:t> F01</a:t>
+            </a:r>
+          </a:p>
+        </p:txBody>
+      </p:sp>
+      <p:pic>
+        <p:nvPicPr>
+          <p:cNvPr id="14" name="Picture 13">
+            <a:extLst>
+              <a:ext uri="{FF2B5EF4-FFF2-40B4-BE49-F238E27FC236}">
+                <a16:creationId xmlns:a16="http://schemas.microsoft.com/office/drawing/2014/main" id="{4A4226F2-EBB9-4D48-8CC4-31CC563F0CCC}"/>
+              </a:ext>
+            </a:extLst>
+          </p:cNvPr>
+          <p:cNvPicPr>
+            <a:picLocks noChangeAspect="1"/>
+          </p:cNvPicPr>
+          <p:nvPr/>
+        </p:nvPicPr>
+        <p:blipFill>
+          <a:blip r:embed="rId3"/>
+          <a:stretch>
+            <a:fillRect/>
+          </a:stretch>
+        </p:blipFill>
+        <p:spPr>
+          <a:xfrm>
+            <a:off x="7295661" y="1566496"/>
+            <a:ext cx="1574800" cy="3162300"/>
+          </a:xfrm>
+          <a:prstGeom prst="rect">
+            <a:avLst/>
+          </a:prstGeom>
+        </p:spPr>
+      </p:pic>
+      <p:pic>
+        <p:nvPicPr>
+          <p:cNvPr id="15" name="Picture 14">
+            <a:extLst>
+              <a:ext uri="{FF2B5EF4-FFF2-40B4-BE49-F238E27FC236}">
+                <a16:creationId xmlns:a16="http://schemas.microsoft.com/office/drawing/2014/main" id="{91D15FCC-CE2A-6946-86BB-CAFFF1787F97}"/>
+              </a:ext>
+            </a:extLst>
+          </p:cNvPr>
+          <p:cNvPicPr>
+            <a:picLocks noChangeAspect="1"/>
+          </p:cNvPicPr>
+          <p:nvPr/>
+        </p:nvPicPr>
+        <p:blipFill rotWithShape="1">
+          <a:blip r:embed="rId2"/>
+          <a:srcRect l="35310" t="35385" r="57799" b="18461"/>
+          <a:stretch/>
+        </p:blipFill>
+        <p:spPr>
+          <a:xfrm>
+            <a:off x="1846387" y="1450703"/>
+            <a:ext cx="294062" cy="1230978"/>
+          </a:xfrm>
+          <a:prstGeom prst="rect">
+            <a:avLst/>
+          </a:prstGeom>
+        </p:spPr>
+      </p:pic>
+      <p:sp>
+        <p:nvSpPr>
+          <p:cNvPr id="16" name="TextBox 15">
+            <a:extLst>
+              <a:ext uri="{FF2B5EF4-FFF2-40B4-BE49-F238E27FC236}">
+                <a16:creationId xmlns:a16="http://schemas.microsoft.com/office/drawing/2014/main" id="{F81FFFFC-8831-3D48-8707-83925DF151E7}"/>
+              </a:ext>
+            </a:extLst>
+          </p:cNvPr>
+          <p:cNvSpPr txBox="1"/>
+          <p:nvPr/>
+        </p:nvSpPr>
+        <p:spPr>
+          <a:xfrm>
+            <a:off x="2076993" y="1424579"/>
+            <a:ext cx="413896" cy="230832"/>
+          </a:xfrm>
+          <a:prstGeom prst="rect">
+            <a:avLst/>
+          </a:prstGeom>
+          <a:noFill/>
+        </p:spPr>
+        <p:txBody>
+          <a:bodyPr wrap="none" rtlCol="0">
+            <a:spAutoFit/>
+          </a:bodyPr>
+          <a:lstStyle/>
+          <a:p>
+            <a:r>
+              <a:rPr lang="en-US" sz="900" dirty="0" err="1"/>
+              <a:t>cul</a:t>
+            </a:r>
+            <a:r>
+              <a:rPr lang="en-US" sz="900" dirty="0"/>
+              <a:t> A</a:t>
+            </a:r>
+          </a:p>
+        </p:txBody>
+      </p:sp>
+      <p:sp>
+        <p:nvSpPr>
+          <p:cNvPr id="17" name="TextBox 16">
+            <a:extLst>
+              <a:ext uri="{FF2B5EF4-FFF2-40B4-BE49-F238E27FC236}">
+                <a16:creationId xmlns:a16="http://schemas.microsoft.com/office/drawing/2014/main" id="{EB2A3BD1-13CD-D14B-8CCC-BEE05D877746}"/>
+              </a:ext>
+            </a:extLst>
+          </p:cNvPr>
+          <p:cNvSpPr txBox="1"/>
+          <p:nvPr/>
+        </p:nvSpPr>
+        <p:spPr>
+          <a:xfrm>
+            <a:off x="2076993" y="1618746"/>
+            <a:ext cx="413896" cy="230832"/>
+          </a:xfrm>
+          <a:prstGeom prst="rect">
+            <a:avLst/>
+          </a:prstGeom>
+          <a:noFill/>
+        </p:spPr>
+        <p:txBody>
+          <a:bodyPr wrap="none" rtlCol="0">
+            <a:spAutoFit/>
+          </a:bodyPr>
+          <a:lstStyle/>
+          <a:p>
+            <a:r>
+              <a:rPr lang="en-US" sz="900" dirty="0" err="1"/>
+              <a:t>cul</a:t>
+            </a:r>
+            <a:r>
+              <a:rPr lang="en-US" sz="900" dirty="0"/>
+              <a:t> B</a:t>
+            </a:r>
+          </a:p>
+        </p:txBody>
+      </p:sp>
+      <p:sp>
+        <p:nvSpPr>
+          <p:cNvPr id="18" name="TextBox 17">
+            <a:extLst>
+              <a:ext uri="{FF2B5EF4-FFF2-40B4-BE49-F238E27FC236}">
+                <a16:creationId xmlns:a16="http://schemas.microsoft.com/office/drawing/2014/main" id="{C464B865-55F7-D543-A3D9-E8E1AA6B9F87}"/>
+              </a:ext>
+            </a:extLst>
+          </p:cNvPr>
+          <p:cNvSpPr txBox="1"/>
+          <p:nvPr/>
+        </p:nvSpPr>
+        <p:spPr>
+          <a:xfrm>
+            <a:off x="2076993" y="1799851"/>
+            <a:ext cx="413896" cy="230832"/>
+          </a:xfrm>
+          <a:prstGeom prst="rect">
+            <a:avLst/>
+          </a:prstGeom>
+          <a:noFill/>
+        </p:spPr>
+        <p:txBody>
+          <a:bodyPr wrap="none" rtlCol="0">
+            <a:spAutoFit/>
+          </a:bodyPr>
+          <a:lstStyle/>
+          <a:p>
+            <a:r>
+              <a:rPr lang="en-US" sz="900" dirty="0" err="1"/>
+              <a:t>cul</a:t>
+            </a:r>
+            <a:r>
+              <a:rPr lang="en-US" sz="900" dirty="0"/>
+              <a:t> C</a:t>
+            </a:r>
+          </a:p>
+        </p:txBody>
+      </p:sp>
+      <p:sp>
+        <p:nvSpPr>
+          <p:cNvPr id="19" name="TextBox 18">
+            <a:extLst>
+              <a:ext uri="{FF2B5EF4-FFF2-40B4-BE49-F238E27FC236}">
+                <a16:creationId xmlns:a16="http://schemas.microsoft.com/office/drawing/2014/main" id="{CBF1EF8E-E632-384F-A37A-F06B12416F5C}"/>
+              </a:ext>
+            </a:extLst>
+          </p:cNvPr>
+          <p:cNvSpPr txBox="1"/>
+          <p:nvPr/>
+        </p:nvSpPr>
+        <p:spPr>
+          <a:xfrm>
+            <a:off x="2076993" y="2002482"/>
+            <a:ext cx="413896" cy="230832"/>
+          </a:xfrm>
+          <a:prstGeom prst="rect">
+            <a:avLst/>
+          </a:prstGeom>
+          <a:noFill/>
+        </p:spPr>
+        <p:txBody>
+          <a:bodyPr wrap="none" rtlCol="0">
+            <a:spAutoFit/>
+          </a:bodyPr>
+          <a:lstStyle/>
+          <a:p>
+            <a:r>
+              <a:rPr lang="en-US" sz="900" dirty="0" err="1"/>
+              <a:t>cul</a:t>
+            </a:r>
+            <a:r>
+              <a:rPr lang="en-US" sz="900" dirty="0"/>
+              <a:t> D</a:t>
+            </a:r>
+          </a:p>
+        </p:txBody>
+      </p:sp>
+      <p:sp>
+        <p:nvSpPr>
+          <p:cNvPr id="20" name="TextBox 19">
+            <a:extLst>
+              <a:ext uri="{FF2B5EF4-FFF2-40B4-BE49-F238E27FC236}">
+                <a16:creationId xmlns:a16="http://schemas.microsoft.com/office/drawing/2014/main" id="{5A43AC8F-674F-0F43-AB32-A5D1288FADDA}"/>
+              </a:ext>
+            </a:extLst>
+          </p:cNvPr>
+          <p:cNvSpPr txBox="1"/>
+          <p:nvPr/>
+        </p:nvSpPr>
+        <p:spPr>
+          <a:xfrm>
+            <a:off x="2076993" y="2198091"/>
+            <a:ext cx="413896" cy="230832"/>
+          </a:xfrm>
+          <a:prstGeom prst="rect">
+            <a:avLst/>
+          </a:prstGeom>
+          <a:noFill/>
+        </p:spPr>
+        <p:txBody>
+          <a:bodyPr wrap="none" rtlCol="0">
+            <a:spAutoFit/>
+          </a:bodyPr>
+          <a:lstStyle/>
+          <a:p>
+            <a:r>
+              <a:rPr lang="en-US" sz="900" dirty="0" err="1"/>
+              <a:t>cul</a:t>
+            </a:r>
+            <a:r>
+              <a:rPr lang="en-US" sz="900" dirty="0"/>
+              <a:t> E</a:t>
+            </a:r>
+          </a:p>
+        </p:txBody>
+      </p:sp>
+      <p:sp>
+        <p:nvSpPr>
+          <p:cNvPr id="21" name="TextBox 20">
+            <a:extLst>
+              <a:ext uri="{FF2B5EF4-FFF2-40B4-BE49-F238E27FC236}">
+                <a16:creationId xmlns:a16="http://schemas.microsoft.com/office/drawing/2014/main" id="{52313D8F-8773-FD4D-A085-CF80D419D97D}"/>
+              </a:ext>
+            </a:extLst>
+          </p:cNvPr>
+          <p:cNvSpPr txBox="1"/>
+          <p:nvPr/>
+        </p:nvSpPr>
+        <p:spPr>
+          <a:xfrm>
+            <a:off x="2076993" y="2381599"/>
+            <a:ext cx="514885" cy="230832"/>
+          </a:xfrm>
+          <a:prstGeom prst="rect">
+            <a:avLst/>
+          </a:prstGeom>
+          <a:noFill/>
+        </p:spPr>
+        <p:txBody>
+          <a:bodyPr wrap="none" rtlCol="0">
+            <a:spAutoFit/>
+          </a:bodyPr>
+          <a:lstStyle/>
+          <a:p>
+            <a:r>
+              <a:rPr lang="en-US" sz="900" dirty="0" err="1"/>
+              <a:t>cul</a:t>
+            </a:r>
+            <a:r>
+              <a:rPr lang="en-US" sz="900" dirty="0"/>
+              <a:t> F01</a:t>
+            </a:r>
+          </a:p>
+        </p:txBody>
+      </p:sp>
+    </p:spTree>
+    <p:extLst>
+      <p:ext uri="{BB962C8B-B14F-4D97-AF65-F5344CB8AC3E}">
+        <p14:creationId xmlns:p14="http://schemas.microsoft.com/office/powerpoint/2010/main" val="3419653359"/>
+      </p:ext>
+    </p:extLst>
+  </p:cSld>
+  <p:clrMapOvr>
+    <a:masterClrMapping/>
+  </p:clrMapOvr>
+</p:sld>
+</file>
+
+<file path=ppt/slides/slide12.xml><?xml version="1.0" encoding="utf-8"?>
+<p:sld xmlns:a="http://schemas.openxmlformats.org/drawingml/2006/main" xmlns:r="http://schemas.openxmlformats.org/officeDocument/2006/relationships" xmlns:p="http://schemas.openxmlformats.org/presentationml/2006/main">
+  <p:cSld>
+    <p:spTree>
+      <p:nvGrpSpPr>
+        <p:cNvPr id="1" name=""/>
+        <p:cNvGrpSpPr/>
+        <p:nvPr/>
+      </p:nvGrpSpPr>
+      <p:grpSpPr>
+        <a:xfrm>
+          <a:off x="0" y="0"/>
+          <a:ext cx="0" cy="0"/>
+          <a:chOff x="0" y="0"/>
+          <a:chExt cx="0" cy="0"/>
+        </a:xfrm>
+      </p:grpSpPr>
+      <p:pic>
+        <p:nvPicPr>
+          <p:cNvPr id="6" name="Picture 5">
+            <a:extLst>
+              <a:ext uri="{FF2B5EF4-FFF2-40B4-BE49-F238E27FC236}">
+                <a16:creationId xmlns:a16="http://schemas.microsoft.com/office/drawing/2014/main" id="{F4CE6627-EFCA-C64A-B29B-24B4A5FB378D}"/>
+              </a:ext>
+            </a:extLst>
+          </p:cNvPr>
+          <p:cNvPicPr>
+            <a:picLocks noChangeAspect="1"/>
+          </p:cNvPicPr>
+          <p:nvPr/>
+        </p:nvPicPr>
+        <p:blipFill rotWithShape="1">
+          <a:blip r:embed="rId2"/>
+          <a:srcRect l="22377" t="17037" r="18827"/>
+          <a:stretch/>
+        </p:blipFill>
+        <p:spPr>
+          <a:xfrm>
+            <a:off x="2523066" y="626533"/>
+            <a:ext cx="6451601" cy="5689600"/>
+          </a:xfrm>
+          <a:prstGeom prst="rect">
+            <a:avLst/>
+          </a:prstGeom>
+        </p:spPr>
+      </p:pic>
     </p:spTree>
     <p:extLst>
       <p:ext uri="{BB962C8B-B14F-4D97-AF65-F5344CB8AC3E}">
         <p14:creationId xmlns:p14="http://schemas.microsoft.com/office/powerpoint/2010/main" val="972493764"/>
+      </p:ext>
+    </p:extLst>
+  </p:cSld>
+  <p:clrMapOvr>
+    <a:masterClrMapping/>
+  </p:clrMapOvr>
+</p:sld>
+</file>
+
+<file path=ppt/slides/slide13.xml><?xml version="1.0" encoding="utf-8"?>
+<p:sld xmlns:a="http://schemas.openxmlformats.org/drawingml/2006/main" xmlns:r="http://schemas.openxmlformats.org/officeDocument/2006/relationships" xmlns:p="http://schemas.openxmlformats.org/presentationml/2006/main">
+  <p:cSld>
+    <p:spTree>
+      <p:nvGrpSpPr>
+        <p:cNvPr id="1" name=""/>
+        <p:cNvGrpSpPr/>
+        <p:nvPr/>
+      </p:nvGrpSpPr>
+      <p:grpSpPr>
+        <a:xfrm>
+          <a:off x="0" y="0"/>
+          <a:ext cx="0" cy="0"/>
+          <a:chOff x="0" y="0"/>
+          <a:chExt cx="0" cy="0"/>
+        </a:xfrm>
+      </p:grpSpPr>
+      <p:pic>
+        <p:nvPicPr>
+          <p:cNvPr id="4" name="Picture 3">
+            <a:extLst>
+              <a:ext uri="{FF2B5EF4-FFF2-40B4-BE49-F238E27FC236}">
+                <a16:creationId xmlns:a16="http://schemas.microsoft.com/office/drawing/2014/main" id="{026B94BE-DDF0-204A-A63F-DC803E4E0F37}"/>
+              </a:ext>
+            </a:extLst>
+          </p:cNvPr>
+          <p:cNvPicPr>
+            <a:picLocks noChangeAspect="1"/>
+          </p:cNvPicPr>
+          <p:nvPr/>
+        </p:nvPicPr>
+        <p:blipFill rotWithShape="1">
+          <a:blip r:embed="rId2"/>
+          <a:srcRect l="8333" t="27901" r="31482" b="37284"/>
+          <a:stretch/>
+        </p:blipFill>
+        <p:spPr>
+          <a:xfrm>
+            <a:off x="1524000" y="1913466"/>
+            <a:ext cx="6604000" cy="2387601"/>
+          </a:xfrm>
+          <a:prstGeom prst="rect">
+            <a:avLst/>
+          </a:prstGeom>
+        </p:spPr>
+      </p:pic>
+    </p:spTree>
+    <p:extLst>
+      <p:ext uri="{BB962C8B-B14F-4D97-AF65-F5344CB8AC3E}">
+        <p14:creationId xmlns:p14="http://schemas.microsoft.com/office/powerpoint/2010/main" val="606684881"/>
+      </p:ext>
+    </p:extLst>
+  </p:cSld>
+  <p:clrMapOvr>
+    <a:masterClrMapping/>
+  </p:clrMapOvr>
+</p:sld>
+</file>
+
+<file path=ppt/slides/slide14.xml><?xml version="1.0" encoding="utf-8"?>
+<p:sld xmlns:a="http://schemas.openxmlformats.org/drawingml/2006/main" xmlns:r="http://schemas.openxmlformats.org/officeDocument/2006/relationships" xmlns:p="http://schemas.openxmlformats.org/presentationml/2006/main">
+  <p:cSld>
+    <p:spTree>
+      <p:nvGrpSpPr>
+        <p:cNvPr id="1" name=""/>
+        <p:cNvGrpSpPr/>
+        <p:nvPr/>
+      </p:nvGrpSpPr>
+      <p:grpSpPr>
+        <a:xfrm>
+          <a:off x="0" y="0"/>
+          <a:ext cx="0" cy="0"/>
+          <a:chOff x="0" y="0"/>
+          <a:chExt cx="0" cy="0"/>
+        </a:xfrm>
+      </p:grpSpPr>
+      <p:pic>
+        <p:nvPicPr>
+          <p:cNvPr id="4" name="Picture 3">
+            <a:extLst>
+              <a:ext uri="{FF2B5EF4-FFF2-40B4-BE49-F238E27FC236}">
+                <a16:creationId xmlns:a16="http://schemas.microsoft.com/office/drawing/2014/main" id="{116DE173-6CEE-5441-BF7F-6075DDF9BDDD}"/>
+              </a:ext>
+            </a:extLst>
+          </p:cNvPr>
+          <p:cNvPicPr>
+            <a:picLocks noChangeAspect="1"/>
+          </p:cNvPicPr>
+          <p:nvPr/>
+        </p:nvPicPr>
+        <p:blipFill rotWithShape="1">
+          <a:blip r:embed="rId2"/>
+          <a:srcRect l="3085" t="10617" r="1235" b="4444"/>
+          <a:stretch/>
+        </p:blipFill>
+        <p:spPr>
+          <a:xfrm>
+            <a:off x="948266" y="728133"/>
+            <a:ext cx="10498667" cy="5825068"/>
+          </a:xfrm>
+          <a:prstGeom prst="rect">
+            <a:avLst/>
+          </a:prstGeom>
+        </p:spPr>
+      </p:pic>
+    </p:spTree>
+    <p:extLst>
+      <p:ext uri="{BB962C8B-B14F-4D97-AF65-F5344CB8AC3E}">
+        <p14:creationId xmlns:p14="http://schemas.microsoft.com/office/powerpoint/2010/main" val="2031950673"/>
+      </p:ext>
+    </p:extLst>
+  </p:cSld>
+  <p:clrMapOvr>
+    <a:masterClrMapping/>
+  </p:clrMapOvr>
+</p:sld>
+</file>
+
+<file path=ppt/slides/slide15.xml><?xml version="1.0" encoding="utf-8"?>
+<p:sld xmlns:a="http://schemas.openxmlformats.org/drawingml/2006/main" xmlns:r="http://schemas.openxmlformats.org/officeDocument/2006/relationships" xmlns:p="http://schemas.openxmlformats.org/presentationml/2006/main">
+  <p:cSld>
+    <p:spTree>
+      <p:nvGrpSpPr>
+        <p:cNvPr id="1" name=""/>
+        <p:cNvGrpSpPr/>
+        <p:nvPr/>
+      </p:nvGrpSpPr>
+      <p:grpSpPr>
+        <a:xfrm>
+          <a:off x="0" y="0"/>
+          <a:ext cx="0" cy="0"/>
+          <a:chOff x="0" y="0"/>
+          <a:chExt cx="0" cy="0"/>
+        </a:xfrm>
+      </p:grpSpPr>
+      <p:pic>
+        <p:nvPicPr>
+          <p:cNvPr id="4" name="Picture 3">
+            <a:extLst>
+              <a:ext uri="{FF2B5EF4-FFF2-40B4-BE49-F238E27FC236}">
+                <a16:creationId xmlns:a16="http://schemas.microsoft.com/office/drawing/2014/main" id="{24588107-71FA-8B4A-8AC5-1BE5F4141617}"/>
+              </a:ext>
+            </a:extLst>
+          </p:cNvPr>
+          <p:cNvPicPr>
+            <a:picLocks noChangeAspect="1"/>
+          </p:cNvPicPr>
+          <p:nvPr/>
+        </p:nvPicPr>
+        <p:blipFill rotWithShape="1">
+          <a:blip r:embed="rId2"/>
+          <a:srcRect l="12037" t="17531" r="58488" b="5926"/>
+          <a:stretch/>
+        </p:blipFill>
+        <p:spPr>
+          <a:xfrm>
+            <a:off x="2895600" y="220134"/>
+            <a:ext cx="3234267" cy="5249334"/>
+          </a:xfrm>
+          <a:prstGeom prst="rect">
+            <a:avLst/>
+          </a:prstGeom>
+        </p:spPr>
+      </p:pic>
+      <p:pic>
+        <p:nvPicPr>
+          <p:cNvPr id="5" name="Picture 4">
+            <a:extLst>
+              <a:ext uri="{FF2B5EF4-FFF2-40B4-BE49-F238E27FC236}">
+                <a16:creationId xmlns:a16="http://schemas.microsoft.com/office/drawing/2014/main" id="{AE95090E-D031-9243-AA1E-BBE90EA2B055}"/>
+              </a:ext>
+            </a:extLst>
+          </p:cNvPr>
+          <p:cNvPicPr>
+            <a:picLocks noChangeAspect="1"/>
+          </p:cNvPicPr>
+          <p:nvPr/>
+        </p:nvPicPr>
+        <p:blipFill rotWithShape="1">
+          <a:blip r:embed="rId2"/>
+          <a:srcRect l="8333" t="94815" r="62894" b="881"/>
+          <a:stretch/>
+        </p:blipFill>
+        <p:spPr>
+          <a:xfrm>
+            <a:off x="2895601" y="5469468"/>
+            <a:ext cx="3157282" cy="295228"/>
+          </a:xfrm>
+          <a:prstGeom prst="rect">
+            <a:avLst/>
+          </a:prstGeom>
+        </p:spPr>
+      </p:pic>
+      <p:pic>
+        <p:nvPicPr>
+          <p:cNvPr id="6" name="Picture 5">
+            <a:extLst>
+              <a:ext uri="{FF2B5EF4-FFF2-40B4-BE49-F238E27FC236}">
+                <a16:creationId xmlns:a16="http://schemas.microsoft.com/office/drawing/2014/main" id="{1C9143C0-EDEF-084E-AEE4-CF18EE6D0FA2}"/>
+              </a:ext>
+            </a:extLst>
+          </p:cNvPr>
+          <p:cNvPicPr>
+            <a:picLocks noChangeAspect="1"/>
+          </p:cNvPicPr>
+          <p:nvPr/>
+        </p:nvPicPr>
+        <p:blipFill rotWithShape="1">
+          <a:blip r:embed="rId2"/>
+          <a:srcRect l="36985" t="95820" r="34242" b="1337"/>
+          <a:stretch/>
+        </p:blipFill>
+        <p:spPr>
+          <a:xfrm>
+            <a:off x="3147949" y="5667186"/>
+            <a:ext cx="3157282" cy="195020"/>
+          </a:xfrm>
+          <a:prstGeom prst="rect">
+            <a:avLst/>
+          </a:prstGeom>
+        </p:spPr>
+      </p:pic>
+    </p:spTree>
+    <p:extLst>
+      <p:ext uri="{BB962C8B-B14F-4D97-AF65-F5344CB8AC3E}">
+        <p14:creationId xmlns:p14="http://schemas.microsoft.com/office/powerpoint/2010/main" val="980186242"/>
       </p:ext>
     </p:extLst>
   </p:cSld>
@@ -6011,6 +6709,38 @@
           </a:p>
         </p:txBody>
       </p:sp>
+      <p:sp>
+        <p:nvSpPr>
+          <p:cNvPr id="31" name="TextBox 30">
+            <a:extLst>
+              <a:ext uri="{FF2B5EF4-FFF2-40B4-BE49-F238E27FC236}">
+                <a16:creationId xmlns:a16="http://schemas.microsoft.com/office/drawing/2014/main" id="{7E25E879-5099-2945-9F94-F5A9B276DC2D}"/>
+              </a:ext>
+            </a:extLst>
+          </p:cNvPr>
+          <p:cNvSpPr txBox="1"/>
+          <p:nvPr/>
+        </p:nvSpPr>
+        <p:spPr>
+          <a:xfrm>
+            <a:off x="11078308" y="1652954"/>
+            <a:ext cx="184731" cy="369332"/>
+          </a:xfrm>
+          <a:prstGeom prst="rect">
+            <a:avLst/>
+          </a:prstGeom>
+          <a:noFill/>
+        </p:spPr>
+        <p:txBody>
+          <a:bodyPr wrap="none" rtlCol="0">
+            <a:spAutoFit/>
+          </a:bodyPr>
+          <a:lstStyle/>
+          <a:p>
+            <a:endParaRPr lang="en-US"/>
+          </a:p>
+        </p:txBody>
+      </p:sp>
     </p:spTree>
     <p:extLst>
       <p:ext uri="{BB962C8B-B14F-4D97-AF65-F5344CB8AC3E}">
@@ -6041,462 +6771,63 @@
           <a:chExt cx="0" cy="0"/>
         </a:xfrm>
       </p:grpSpPr>
-      <p:pic>
-        <p:nvPicPr>
-          <p:cNvPr id="7" name="Picture 6">
-            <a:extLst>
-              <a:ext uri="{FF2B5EF4-FFF2-40B4-BE49-F238E27FC236}">
-                <a16:creationId xmlns:a16="http://schemas.microsoft.com/office/drawing/2014/main" id="{D28D2488-34FF-4C42-90A6-921146528101}"/>
-              </a:ext>
-            </a:extLst>
-          </p:cNvPr>
-          <p:cNvPicPr>
-            <a:picLocks noChangeAspect="1"/>
-          </p:cNvPicPr>
-          <p:nvPr/>
-        </p:nvPicPr>
-        <p:blipFill>
-          <a:blip r:embed="rId2"/>
-          <a:stretch>
-            <a:fillRect/>
-          </a:stretch>
-        </p:blipFill>
-        <p:spPr>
-          <a:xfrm>
-            <a:off x="6137033" y="717063"/>
-            <a:ext cx="3810000" cy="2540000"/>
-          </a:xfrm>
-          <a:prstGeom prst="rect">
-            <a:avLst/>
-          </a:prstGeom>
-        </p:spPr>
-      </p:pic>
-      <p:pic>
-        <p:nvPicPr>
-          <p:cNvPr id="9" name="Picture 8">
-            <a:extLst>
-              <a:ext uri="{FF2B5EF4-FFF2-40B4-BE49-F238E27FC236}">
-                <a16:creationId xmlns:a16="http://schemas.microsoft.com/office/drawing/2014/main" id="{2EC4C86B-D766-5548-9424-936EEAE4A5C2}"/>
-              </a:ext>
-            </a:extLst>
-          </p:cNvPr>
-          <p:cNvPicPr>
-            <a:picLocks noChangeAspect="1"/>
-          </p:cNvPicPr>
-          <p:nvPr/>
-        </p:nvPicPr>
-        <p:blipFill>
-          <a:blip r:embed="rId3"/>
-          <a:stretch>
-            <a:fillRect/>
-          </a:stretch>
-        </p:blipFill>
-        <p:spPr>
-          <a:xfrm>
-            <a:off x="2327033" y="717063"/>
-            <a:ext cx="3810000" cy="2540000"/>
-          </a:xfrm>
-          <a:prstGeom prst="rect">
-            <a:avLst/>
-          </a:prstGeom>
-        </p:spPr>
-      </p:pic>
-      <p:sp>
-        <p:nvSpPr>
-          <p:cNvPr id="11" name="TextBox 10">
-            <a:extLst>
-              <a:ext uri="{FF2B5EF4-FFF2-40B4-BE49-F238E27FC236}">
-                <a16:creationId xmlns:a16="http://schemas.microsoft.com/office/drawing/2014/main" id="{ABB7AD28-3CAA-AD48-97F7-03E63E8EE317}"/>
-              </a:ext>
-            </a:extLst>
-          </p:cNvPr>
-          <p:cNvSpPr txBox="1"/>
-          <p:nvPr/>
-        </p:nvSpPr>
-        <p:spPr>
-          <a:xfrm>
-            <a:off x="426879" y="1129208"/>
-            <a:ext cx="546303" cy="369332"/>
-          </a:xfrm>
-          <a:prstGeom prst="rect">
-            <a:avLst/>
-          </a:prstGeom>
-          <a:noFill/>
-        </p:spPr>
-        <p:txBody>
-          <a:bodyPr wrap="none" rtlCol="0">
-            <a:spAutoFit/>
-          </a:bodyPr>
-          <a:lstStyle/>
-          <a:p>
-            <a:r>
-              <a:rPr lang="en-US" dirty="0"/>
-              <a:t>FBA</a:t>
-            </a:r>
-          </a:p>
-        </p:txBody>
-      </p:sp>
-      <p:sp>
-        <p:nvSpPr>
-          <p:cNvPr id="12" name="TextBox 11">
-            <a:extLst>
-              <a:ext uri="{FF2B5EF4-FFF2-40B4-BE49-F238E27FC236}">
-                <a16:creationId xmlns:a16="http://schemas.microsoft.com/office/drawing/2014/main" id="{AC36CD01-16D7-4743-BBFC-2E85B73E3621}"/>
-              </a:ext>
-            </a:extLst>
-          </p:cNvPr>
-          <p:cNvSpPr txBox="1"/>
-          <p:nvPr/>
-        </p:nvSpPr>
-        <p:spPr>
-          <a:xfrm rot="16200000">
-            <a:off x="1423461" y="1833174"/>
-            <a:ext cx="1449499" cy="307777"/>
-          </a:xfrm>
-          <a:prstGeom prst="rect">
-            <a:avLst/>
-          </a:prstGeom>
-          <a:noFill/>
-        </p:spPr>
-        <p:txBody>
-          <a:bodyPr wrap="none" rtlCol="0">
-            <a:spAutoFit/>
-          </a:bodyPr>
-          <a:lstStyle/>
-          <a:p>
-            <a:r>
-              <a:rPr lang="el-GR" sz="1400" dirty="0"/>
-              <a:t>μ</a:t>
-            </a:r>
-            <a:r>
-              <a:rPr lang="en-US" sz="1400" dirty="0"/>
-              <a:t> (</a:t>
-            </a:r>
-            <a:r>
-              <a:rPr lang="en-US" sz="1400" dirty="0" err="1"/>
-              <a:t>gDW</a:t>
-            </a:r>
-            <a:r>
-              <a:rPr lang="en-US" sz="1400" dirty="0"/>
-              <a:t>/ </a:t>
-            </a:r>
-            <a:r>
-              <a:rPr lang="en-US" sz="1400" dirty="0" err="1"/>
-              <a:t>gDW</a:t>
-            </a:r>
-            <a:r>
-              <a:rPr lang="en-US" sz="1400" dirty="0"/>
-              <a:t> </a:t>
-            </a:r>
-            <a:r>
-              <a:rPr lang="en-US" sz="1400" dirty="0" err="1"/>
-              <a:t>hr</a:t>
-            </a:r>
-            <a:r>
-              <a:rPr lang="en-US" sz="1400" dirty="0"/>
-              <a:t>)</a:t>
-            </a:r>
-          </a:p>
-        </p:txBody>
-      </p:sp>
-      <p:sp>
-        <p:nvSpPr>
-          <p:cNvPr id="13" name="TextBox 12">
-            <a:extLst>
-              <a:ext uri="{FF2B5EF4-FFF2-40B4-BE49-F238E27FC236}">
-                <a16:creationId xmlns:a16="http://schemas.microsoft.com/office/drawing/2014/main" id="{40407CFD-1E81-F445-BD03-505E6AFD1847}"/>
-              </a:ext>
-            </a:extLst>
-          </p:cNvPr>
-          <p:cNvSpPr txBox="1"/>
-          <p:nvPr/>
-        </p:nvSpPr>
-        <p:spPr>
-          <a:xfrm>
-            <a:off x="3823011" y="409286"/>
-            <a:ext cx="818044" cy="307777"/>
-          </a:xfrm>
-          <a:prstGeom prst="rect">
-            <a:avLst/>
-          </a:prstGeom>
-          <a:noFill/>
-        </p:spPr>
-        <p:txBody>
-          <a:bodyPr wrap="none" rtlCol="0">
-            <a:spAutoFit/>
-          </a:bodyPr>
-          <a:lstStyle/>
-          <a:p>
-            <a:r>
-              <a:rPr lang="en-US" sz="1400" dirty="0"/>
-              <a:t>Recon3d</a:t>
-            </a:r>
-          </a:p>
-        </p:txBody>
-      </p:sp>
-      <p:sp>
-        <p:nvSpPr>
-          <p:cNvPr id="14" name="TextBox 13">
-            <a:extLst>
-              <a:ext uri="{FF2B5EF4-FFF2-40B4-BE49-F238E27FC236}">
-                <a16:creationId xmlns:a16="http://schemas.microsoft.com/office/drawing/2014/main" id="{5946E59F-3513-1F40-9C47-2F0ADD3C826D}"/>
-              </a:ext>
-            </a:extLst>
-          </p:cNvPr>
-          <p:cNvSpPr txBox="1"/>
-          <p:nvPr/>
-        </p:nvSpPr>
-        <p:spPr>
-          <a:xfrm>
-            <a:off x="7786193" y="409285"/>
-            <a:ext cx="511679" cy="307777"/>
-          </a:xfrm>
-          <a:prstGeom prst="rect">
-            <a:avLst/>
-          </a:prstGeom>
-          <a:noFill/>
-        </p:spPr>
-        <p:txBody>
-          <a:bodyPr wrap="none" rtlCol="0">
-            <a:spAutoFit/>
-          </a:bodyPr>
-          <a:lstStyle/>
-          <a:p>
-            <a:r>
-              <a:rPr lang="en-US" sz="1400" dirty="0"/>
-              <a:t>CHO</a:t>
-            </a:r>
-          </a:p>
-        </p:txBody>
-      </p:sp>
-      <p:pic>
-        <p:nvPicPr>
-          <p:cNvPr id="16" name="Picture 15">
-            <a:extLst>
-              <a:ext uri="{FF2B5EF4-FFF2-40B4-BE49-F238E27FC236}">
-                <a16:creationId xmlns:a16="http://schemas.microsoft.com/office/drawing/2014/main" id="{BB752082-52AC-0C49-962A-3F3C3EEF6806}"/>
-              </a:ext>
-            </a:extLst>
-          </p:cNvPr>
-          <p:cNvPicPr>
-            <a:picLocks noChangeAspect="1"/>
-          </p:cNvPicPr>
-          <p:nvPr/>
-        </p:nvPicPr>
-        <p:blipFill>
-          <a:blip r:embed="rId4"/>
-          <a:stretch>
-            <a:fillRect/>
-          </a:stretch>
-        </p:blipFill>
-        <p:spPr>
-          <a:xfrm>
-            <a:off x="6137033" y="3257063"/>
-            <a:ext cx="3810000" cy="2540000"/>
-          </a:xfrm>
-          <a:prstGeom prst="rect">
-            <a:avLst/>
-          </a:prstGeom>
-        </p:spPr>
-      </p:pic>
-      <p:pic>
-        <p:nvPicPr>
-          <p:cNvPr id="18" name="Picture 17">
-            <a:extLst>
-              <a:ext uri="{FF2B5EF4-FFF2-40B4-BE49-F238E27FC236}">
-                <a16:creationId xmlns:a16="http://schemas.microsoft.com/office/drawing/2014/main" id="{C5AFFB02-88AB-D340-BE42-8A8B3D11E4DB}"/>
-              </a:ext>
-            </a:extLst>
-          </p:cNvPr>
-          <p:cNvPicPr>
-            <a:picLocks noChangeAspect="1"/>
-          </p:cNvPicPr>
-          <p:nvPr/>
-        </p:nvPicPr>
-        <p:blipFill>
-          <a:blip r:embed="rId5"/>
-          <a:stretch>
-            <a:fillRect/>
-          </a:stretch>
-        </p:blipFill>
-        <p:spPr>
-          <a:xfrm>
-            <a:off x="2327032" y="3257063"/>
-            <a:ext cx="3810000" cy="2540000"/>
-          </a:xfrm>
-          <a:prstGeom prst="rect">
-            <a:avLst/>
-          </a:prstGeom>
-        </p:spPr>
-      </p:pic>
-      <p:sp>
-        <p:nvSpPr>
-          <p:cNvPr id="19" name="TextBox 18">
-            <a:extLst>
-              <a:ext uri="{FF2B5EF4-FFF2-40B4-BE49-F238E27FC236}">
-                <a16:creationId xmlns:a16="http://schemas.microsoft.com/office/drawing/2014/main" id="{70D6C03F-6E0A-8048-A1A7-9697D447F982}"/>
-              </a:ext>
-            </a:extLst>
-          </p:cNvPr>
-          <p:cNvSpPr txBox="1"/>
-          <p:nvPr/>
-        </p:nvSpPr>
-        <p:spPr>
-          <a:xfrm rot="16200000">
-            <a:off x="1626433" y="4373174"/>
-            <a:ext cx="1043555" cy="307777"/>
-          </a:xfrm>
-          <a:prstGeom prst="rect">
-            <a:avLst/>
-          </a:prstGeom>
-          <a:noFill/>
-        </p:spPr>
-        <p:txBody>
-          <a:bodyPr wrap="none" rtlCol="0">
-            <a:spAutoFit/>
-          </a:bodyPr>
-          <a:lstStyle/>
-          <a:p>
-            <a:r>
-              <a:rPr lang="en-US" sz="1400" dirty="0"/>
-              <a:t>Xv (</a:t>
-            </a:r>
-            <a:r>
-              <a:rPr lang="en-US" sz="1400" dirty="0" err="1"/>
-              <a:t>gDW</a:t>
-            </a:r>
-            <a:r>
-              <a:rPr lang="en-US" sz="1400" dirty="0"/>
-              <a:t>/ L)</a:t>
-            </a:r>
-          </a:p>
-        </p:txBody>
-      </p:sp>
-      <p:sp>
-        <p:nvSpPr>
-          <p:cNvPr id="20" name="TextBox 19">
-            <a:extLst>
-              <a:ext uri="{FF2B5EF4-FFF2-40B4-BE49-F238E27FC236}">
-                <a16:creationId xmlns:a16="http://schemas.microsoft.com/office/drawing/2014/main" id="{43C61DF8-BC94-E64F-804C-65373D3CF80C}"/>
-              </a:ext>
-            </a:extLst>
-          </p:cNvPr>
-          <p:cNvSpPr txBox="1"/>
-          <p:nvPr/>
-        </p:nvSpPr>
-        <p:spPr>
-          <a:xfrm>
-            <a:off x="5453502" y="5797063"/>
-            <a:ext cx="1416926" cy="369332"/>
-          </a:xfrm>
-          <a:prstGeom prst="rect">
-            <a:avLst/>
-          </a:prstGeom>
-          <a:noFill/>
-        </p:spPr>
-        <p:txBody>
-          <a:bodyPr wrap="none" rtlCol="0">
-            <a:spAutoFit/>
-          </a:bodyPr>
-          <a:lstStyle/>
-          <a:p>
-            <a:r>
-              <a:rPr lang="el-GR" dirty="0"/>
-              <a:t>ξ</a:t>
-            </a:r>
-            <a:r>
-              <a:rPr lang="en-US" dirty="0"/>
-              <a:t> (</a:t>
-            </a:r>
-            <a:r>
-              <a:rPr lang="en-US" dirty="0" err="1"/>
-              <a:t>gDW</a:t>
-            </a:r>
-            <a:r>
-              <a:rPr lang="en-US" dirty="0"/>
-              <a:t> </a:t>
-            </a:r>
-            <a:r>
-              <a:rPr lang="en-US" dirty="0" err="1"/>
-              <a:t>hr</a:t>
-            </a:r>
-            <a:r>
-              <a:rPr lang="en-US" dirty="0"/>
-              <a:t>/ L)</a:t>
-            </a:r>
-          </a:p>
-        </p:txBody>
-      </p:sp>
-      <p:pic>
-        <p:nvPicPr>
-          <p:cNvPr id="39" name="Picture 38">
-            <a:extLst>
-              <a:ext uri="{FF2B5EF4-FFF2-40B4-BE49-F238E27FC236}">
-                <a16:creationId xmlns:a16="http://schemas.microsoft.com/office/drawing/2014/main" id="{71A2B2E3-038E-9E4C-B2C5-067DCB7D2F65}"/>
-              </a:ext>
-            </a:extLst>
-          </p:cNvPr>
-          <p:cNvPicPr>
-            <a:picLocks noChangeAspect="1"/>
-          </p:cNvPicPr>
-          <p:nvPr/>
-        </p:nvPicPr>
-        <p:blipFill>
-          <a:blip r:embed="rId6"/>
-          <a:stretch>
-            <a:fillRect/>
-          </a:stretch>
-        </p:blipFill>
-        <p:spPr>
-          <a:xfrm>
-            <a:off x="8663333" y="951672"/>
-            <a:ext cx="749300" cy="1257300"/>
-          </a:xfrm>
-          <a:prstGeom prst="rect">
-            <a:avLst/>
-          </a:prstGeom>
-          <a:noFill/>
-        </p:spPr>
-      </p:pic>
-      <p:sp>
-        <p:nvSpPr>
-          <p:cNvPr id="40" name="TextBox 39">
-            <a:extLst>
-              <a:ext uri="{FF2B5EF4-FFF2-40B4-BE49-F238E27FC236}">
-                <a16:creationId xmlns:a16="http://schemas.microsoft.com/office/drawing/2014/main" id="{B396D9E8-B37A-1E42-A9A7-B1FF733189E7}"/>
-              </a:ext>
-            </a:extLst>
-          </p:cNvPr>
-          <p:cNvSpPr txBox="1"/>
-          <p:nvPr/>
-        </p:nvSpPr>
-        <p:spPr>
-          <a:xfrm>
-            <a:off x="575733" y="508000"/>
-            <a:ext cx="568489" cy="369332"/>
-          </a:xfrm>
-          <a:prstGeom prst="rect">
-            <a:avLst/>
-          </a:prstGeom>
-          <a:noFill/>
-        </p:spPr>
-        <p:txBody>
-          <a:bodyPr wrap="none" rtlCol="0">
-            <a:spAutoFit/>
-          </a:bodyPr>
+      <p:sp>
+        <p:nvSpPr>
+          <p:cNvPr id="2" name="Title 1">
+            <a:extLst>
+              <a:ext uri="{FF2B5EF4-FFF2-40B4-BE49-F238E27FC236}">
+                <a16:creationId xmlns:a16="http://schemas.microsoft.com/office/drawing/2014/main" id="{0FFC4416-3EC8-DD4F-8E4A-DD19321F9AC6}"/>
+              </a:ext>
+            </a:extLst>
+          </p:cNvPr>
+          <p:cNvSpPr>
+            <a:spLocks noGrp="1"/>
+          </p:cNvSpPr>
+          <p:nvPr>
+            <p:ph type="title"/>
+          </p:nvPr>
+        </p:nvSpPr>
+        <p:spPr/>
+        <p:txBody>
+          <a:bodyPr/>
           <a:lstStyle/>
           <a:p>
             <a:r>
               <a:rPr lang="en-US" dirty="0"/>
               <a:t>Low</a:t>
             </a:r>
+          </a:p>
+        </p:txBody>
+      </p:sp>
+      <p:sp>
+        <p:nvSpPr>
+          <p:cNvPr id="3" name="Content Placeholder 2">
+            <a:extLst>
+              <a:ext uri="{FF2B5EF4-FFF2-40B4-BE49-F238E27FC236}">
+                <a16:creationId xmlns:a16="http://schemas.microsoft.com/office/drawing/2014/main" id="{274C9154-1EB1-6741-A6E3-9E9442637C28}"/>
+              </a:ext>
+            </a:extLst>
+          </p:cNvPr>
+          <p:cNvSpPr>
+            <a:spLocks noGrp="1"/>
+          </p:cNvSpPr>
+          <p:nvPr>
+            <p:ph idx="1"/>
+          </p:nvPr>
+        </p:nvSpPr>
+        <p:spPr/>
+        <p:txBody>
+          <a:bodyPr/>
+          <a:lstStyle/>
+          <a:p>
+            <a:endParaRPr lang="en-US"/>
           </a:p>
         </p:txBody>
       </p:sp>
     </p:spTree>
     <p:extLst>
       <p:ext uri="{BB962C8B-B14F-4D97-AF65-F5344CB8AC3E}">
-        <p14:creationId xmlns:p14="http://schemas.microsoft.com/office/powerpoint/2010/main" val="489004764"/>
+        <p14:creationId xmlns:p14="http://schemas.microsoft.com/office/powerpoint/2010/main" val="3804207008"/>
       </p:ext>
     </p:extLst>
   </p:cSld>
@@ -6525,10 +6856,10 @@
       </p:grpSpPr>
       <p:pic>
         <p:nvPicPr>
-          <p:cNvPr id="17" name="Picture 16">
-            <a:extLst>
-              <a:ext uri="{FF2B5EF4-FFF2-40B4-BE49-F238E27FC236}">
-                <a16:creationId xmlns:a16="http://schemas.microsoft.com/office/drawing/2014/main" id="{AC505F9B-FFCD-D845-97B4-10B0FD9576C1}"/>
+          <p:cNvPr id="7" name="Picture 6">
+            <a:extLst>
+              <a:ext uri="{FF2B5EF4-FFF2-40B4-BE49-F238E27FC236}">
+                <a16:creationId xmlns:a16="http://schemas.microsoft.com/office/drawing/2014/main" id="{D28D2488-34FF-4C42-90A6-921146528101}"/>
               </a:ext>
             </a:extLst>
           </p:cNvPr>
@@ -6545,7 +6876,7 @@
         </p:blipFill>
         <p:spPr>
           <a:xfrm>
-            <a:off x="6009186" y="941737"/>
+            <a:off x="6137033" y="717063"/>
             <a:ext cx="3810000" cy="2540000"/>
           </a:xfrm>
           <a:prstGeom prst="rect">
@@ -6553,184 +6884,12 @@
           </a:prstGeom>
         </p:spPr>
       </p:pic>
-      <p:sp>
-        <p:nvSpPr>
-          <p:cNvPr id="8" name="TextBox 7">
-            <a:extLst>
-              <a:ext uri="{FF2B5EF4-FFF2-40B4-BE49-F238E27FC236}">
-                <a16:creationId xmlns:a16="http://schemas.microsoft.com/office/drawing/2014/main" id="{1CA84E07-5817-B442-B535-EA441BE26F02}"/>
-              </a:ext>
-            </a:extLst>
-          </p:cNvPr>
-          <p:cNvSpPr txBox="1"/>
-          <p:nvPr/>
-        </p:nvSpPr>
-        <p:spPr>
-          <a:xfrm>
-            <a:off x="3685900" y="631288"/>
-            <a:ext cx="818044" cy="307777"/>
-          </a:xfrm>
-          <a:prstGeom prst="rect">
-            <a:avLst/>
-          </a:prstGeom>
-          <a:noFill/>
-        </p:spPr>
-        <p:txBody>
-          <a:bodyPr wrap="none" rtlCol="0">
-            <a:spAutoFit/>
-          </a:bodyPr>
-          <a:lstStyle/>
-          <a:p>
-            <a:r>
-              <a:rPr lang="en-US" sz="1400" dirty="0"/>
-              <a:t>Recon3d</a:t>
-            </a:r>
-          </a:p>
-        </p:txBody>
-      </p:sp>
-      <p:sp>
-        <p:nvSpPr>
-          <p:cNvPr id="9" name="TextBox 8">
-            <a:extLst>
-              <a:ext uri="{FF2B5EF4-FFF2-40B4-BE49-F238E27FC236}">
-                <a16:creationId xmlns:a16="http://schemas.microsoft.com/office/drawing/2014/main" id="{25167EBE-19A2-4E42-A23F-CBDAF47BE8A0}"/>
-              </a:ext>
-            </a:extLst>
-          </p:cNvPr>
-          <p:cNvSpPr txBox="1"/>
-          <p:nvPr/>
-        </p:nvSpPr>
-        <p:spPr>
-          <a:xfrm>
-            <a:off x="7649082" y="631288"/>
-            <a:ext cx="511679" cy="307777"/>
-          </a:xfrm>
-          <a:prstGeom prst="rect">
-            <a:avLst/>
-          </a:prstGeom>
-          <a:noFill/>
-        </p:spPr>
-        <p:txBody>
-          <a:bodyPr wrap="none" rtlCol="0">
-            <a:spAutoFit/>
-          </a:bodyPr>
-          <a:lstStyle/>
-          <a:p>
-            <a:r>
-              <a:rPr lang="en-US" sz="1400" dirty="0"/>
-              <a:t>CHO</a:t>
-            </a:r>
-          </a:p>
-        </p:txBody>
-      </p:sp>
-      <p:sp>
-        <p:nvSpPr>
-          <p:cNvPr id="14" name="TextBox 13">
-            <a:extLst>
-              <a:ext uri="{FF2B5EF4-FFF2-40B4-BE49-F238E27FC236}">
-                <a16:creationId xmlns:a16="http://schemas.microsoft.com/office/drawing/2014/main" id="{DD945BEE-82C1-2343-8357-969737A9957B}"/>
-              </a:ext>
-            </a:extLst>
-          </p:cNvPr>
-          <p:cNvSpPr txBox="1"/>
-          <p:nvPr/>
-        </p:nvSpPr>
-        <p:spPr>
-          <a:xfrm rot="16200000">
-            <a:off x="998872" y="3325176"/>
-            <a:ext cx="1985223" cy="307777"/>
-          </a:xfrm>
-          <a:prstGeom prst="rect">
-            <a:avLst/>
-          </a:prstGeom>
-          <a:noFill/>
-        </p:spPr>
-        <p:txBody>
-          <a:bodyPr wrap="none" rtlCol="0">
-            <a:spAutoFit/>
-          </a:bodyPr>
-          <a:lstStyle/>
-          <a:p>
-            <a:r>
-              <a:rPr lang="en-US" sz="1400" dirty="0"/>
-              <a:t>Model u(mmol/ </a:t>
-            </a:r>
-            <a:r>
-              <a:rPr lang="en-US" sz="1400" dirty="0" err="1"/>
-              <a:t>gDW</a:t>
-            </a:r>
-            <a:r>
-              <a:rPr lang="en-US" sz="1400" dirty="0"/>
-              <a:t> </a:t>
-            </a:r>
-            <a:r>
-              <a:rPr lang="en-US" sz="1400" dirty="0" err="1"/>
-              <a:t>hr</a:t>
-            </a:r>
-            <a:r>
-              <a:rPr lang="en-US" sz="1400" dirty="0"/>
-              <a:t>)</a:t>
-            </a:r>
-          </a:p>
-        </p:txBody>
-      </p:sp>
-      <p:sp>
-        <p:nvSpPr>
-          <p:cNvPr id="15" name="TextBox 14">
-            <a:extLst>
-              <a:ext uri="{FF2B5EF4-FFF2-40B4-BE49-F238E27FC236}">
-                <a16:creationId xmlns:a16="http://schemas.microsoft.com/office/drawing/2014/main" id="{8C3A490E-CFA7-5245-B3CF-1C19D32566A6}"/>
-              </a:ext>
-            </a:extLst>
-          </p:cNvPr>
-          <p:cNvSpPr txBox="1"/>
-          <p:nvPr/>
-        </p:nvSpPr>
-        <p:spPr>
-          <a:xfrm>
-            <a:off x="4601392" y="6019065"/>
-            <a:ext cx="2478307" cy="307777"/>
-          </a:xfrm>
-          <a:prstGeom prst="rect">
-            <a:avLst/>
-          </a:prstGeom>
-          <a:noFill/>
-        </p:spPr>
-        <p:txBody>
-          <a:bodyPr wrap="none" rtlCol="0">
-            <a:spAutoFit/>
-          </a:bodyPr>
-          <a:lstStyle/>
-          <a:p>
-            <a:r>
-              <a:rPr lang="en-US" sz="1400" dirty="0"/>
-              <a:t>Experimental u(mmol/ </a:t>
-            </a:r>
-            <a:r>
-              <a:rPr lang="en-US" sz="1400" dirty="0" err="1"/>
-              <a:t>gDW</a:t>
-            </a:r>
-            <a:r>
-              <a:rPr lang="en-US" sz="1400" dirty="0"/>
-              <a:t> </a:t>
-            </a:r>
-            <a:r>
-              <a:rPr lang="en-US" sz="1400" dirty="0" err="1"/>
-              <a:t>hr</a:t>
-            </a:r>
-            <a:r>
-              <a:rPr lang="en-US" sz="1400" dirty="0"/>
-              <a:t>)</a:t>
-            </a:r>
-          </a:p>
-        </p:txBody>
-      </p:sp>
       <p:pic>
         <p:nvPicPr>
-          <p:cNvPr id="19" name="Picture 18">
-            <a:extLst>
-              <a:ext uri="{FF2B5EF4-FFF2-40B4-BE49-F238E27FC236}">
-                <a16:creationId xmlns:a16="http://schemas.microsoft.com/office/drawing/2014/main" id="{E8DF4DF5-7BC4-5E44-90A2-5CD2C2E31702}"/>
+          <p:cNvPr id="9" name="Picture 8">
+            <a:extLst>
+              <a:ext uri="{FF2B5EF4-FFF2-40B4-BE49-F238E27FC236}">
+                <a16:creationId xmlns:a16="http://schemas.microsoft.com/office/drawing/2014/main" id="{2EC4C86B-D766-5548-9424-936EEAE4A5C2}"/>
               </a:ext>
             </a:extLst>
           </p:cNvPr>
@@ -6747,7 +6906,7 @@
         </p:blipFill>
         <p:spPr>
           <a:xfrm>
-            <a:off x="2194554" y="952135"/>
+            <a:off x="2327033" y="717063"/>
             <a:ext cx="3810000" cy="2540000"/>
           </a:xfrm>
           <a:prstGeom prst="rect">
@@ -6755,12 +6914,180 @@
           </a:prstGeom>
         </p:spPr>
       </p:pic>
+      <p:sp>
+        <p:nvSpPr>
+          <p:cNvPr id="11" name="TextBox 10">
+            <a:extLst>
+              <a:ext uri="{FF2B5EF4-FFF2-40B4-BE49-F238E27FC236}">
+                <a16:creationId xmlns:a16="http://schemas.microsoft.com/office/drawing/2014/main" id="{ABB7AD28-3CAA-AD48-97F7-03E63E8EE317}"/>
+              </a:ext>
+            </a:extLst>
+          </p:cNvPr>
+          <p:cNvSpPr txBox="1"/>
+          <p:nvPr/>
+        </p:nvSpPr>
+        <p:spPr>
+          <a:xfrm>
+            <a:off x="426879" y="1129208"/>
+            <a:ext cx="546303" cy="369332"/>
+          </a:xfrm>
+          <a:prstGeom prst="rect">
+            <a:avLst/>
+          </a:prstGeom>
+          <a:noFill/>
+        </p:spPr>
+        <p:txBody>
+          <a:bodyPr wrap="none" rtlCol="0">
+            <a:spAutoFit/>
+          </a:bodyPr>
+          <a:lstStyle/>
+          <a:p>
+            <a:r>
+              <a:rPr lang="en-US" dirty="0"/>
+              <a:t>FBA</a:t>
+            </a:r>
+          </a:p>
+        </p:txBody>
+      </p:sp>
+      <p:sp>
+        <p:nvSpPr>
+          <p:cNvPr id="12" name="TextBox 11">
+            <a:extLst>
+              <a:ext uri="{FF2B5EF4-FFF2-40B4-BE49-F238E27FC236}">
+                <a16:creationId xmlns:a16="http://schemas.microsoft.com/office/drawing/2014/main" id="{AC36CD01-16D7-4743-BBFC-2E85B73E3621}"/>
+              </a:ext>
+            </a:extLst>
+          </p:cNvPr>
+          <p:cNvSpPr txBox="1"/>
+          <p:nvPr/>
+        </p:nvSpPr>
+        <p:spPr>
+          <a:xfrm rot="16200000">
+            <a:off x="1423461" y="1833174"/>
+            <a:ext cx="1449499" cy="307777"/>
+          </a:xfrm>
+          <a:prstGeom prst="rect">
+            <a:avLst/>
+          </a:prstGeom>
+          <a:noFill/>
+        </p:spPr>
+        <p:txBody>
+          <a:bodyPr wrap="none" rtlCol="0">
+            <a:spAutoFit/>
+          </a:bodyPr>
+          <a:lstStyle/>
+          <a:p>
+            <a:r>
+              <a:rPr lang="el-GR" sz="1400" dirty="0"/>
+              <a:t>μ</a:t>
+            </a:r>
+            <a:r>
+              <a:rPr lang="en-US" sz="1400" dirty="0"/>
+              <a:t> (</a:t>
+            </a:r>
+            <a:r>
+              <a:rPr lang="en-US" sz="1400" dirty="0" err="1"/>
+              <a:t>gDW</a:t>
+            </a:r>
+            <a:r>
+              <a:rPr lang="en-US" sz="1400" dirty="0"/>
+              <a:t>/ </a:t>
+            </a:r>
+            <a:r>
+              <a:rPr lang="en-US" sz="1400" dirty="0" err="1"/>
+              <a:t>gDW</a:t>
+            </a:r>
+            <a:r>
+              <a:rPr lang="en-US" sz="1400" dirty="0"/>
+              <a:t> </a:t>
+            </a:r>
+            <a:r>
+              <a:rPr lang="en-US" sz="1400" dirty="0" err="1"/>
+              <a:t>hr</a:t>
+            </a:r>
+            <a:r>
+              <a:rPr lang="en-US" sz="1400" dirty="0"/>
+              <a:t>)</a:t>
+            </a:r>
+          </a:p>
+        </p:txBody>
+      </p:sp>
+      <p:sp>
+        <p:nvSpPr>
+          <p:cNvPr id="13" name="TextBox 12">
+            <a:extLst>
+              <a:ext uri="{FF2B5EF4-FFF2-40B4-BE49-F238E27FC236}">
+                <a16:creationId xmlns:a16="http://schemas.microsoft.com/office/drawing/2014/main" id="{40407CFD-1E81-F445-BD03-505E6AFD1847}"/>
+              </a:ext>
+            </a:extLst>
+          </p:cNvPr>
+          <p:cNvSpPr txBox="1"/>
+          <p:nvPr/>
+        </p:nvSpPr>
+        <p:spPr>
+          <a:xfrm>
+            <a:off x="3823011" y="409286"/>
+            <a:ext cx="818044" cy="307777"/>
+          </a:xfrm>
+          <a:prstGeom prst="rect">
+            <a:avLst/>
+          </a:prstGeom>
+          <a:noFill/>
+        </p:spPr>
+        <p:txBody>
+          <a:bodyPr wrap="none" rtlCol="0">
+            <a:spAutoFit/>
+          </a:bodyPr>
+          <a:lstStyle/>
+          <a:p>
+            <a:r>
+              <a:rPr lang="en-US" sz="1400" dirty="0"/>
+              <a:t>Recon3d</a:t>
+            </a:r>
+          </a:p>
+        </p:txBody>
+      </p:sp>
+      <p:sp>
+        <p:nvSpPr>
+          <p:cNvPr id="14" name="TextBox 13">
+            <a:extLst>
+              <a:ext uri="{FF2B5EF4-FFF2-40B4-BE49-F238E27FC236}">
+                <a16:creationId xmlns:a16="http://schemas.microsoft.com/office/drawing/2014/main" id="{5946E59F-3513-1F40-9C47-2F0ADD3C826D}"/>
+              </a:ext>
+            </a:extLst>
+          </p:cNvPr>
+          <p:cNvSpPr txBox="1"/>
+          <p:nvPr/>
+        </p:nvSpPr>
+        <p:spPr>
+          <a:xfrm>
+            <a:off x="7786193" y="409285"/>
+            <a:ext cx="511679" cy="307777"/>
+          </a:xfrm>
+          <a:prstGeom prst="rect">
+            <a:avLst/>
+          </a:prstGeom>
+          <a:noFill/>
+        </p:spPr>
+        <p:txBody>
+          <a:bodyPr wrap="none" rtlCol="0">
+            <a:spAutoFit/>
+          </a:bodyPr>
+          <a:lstStyle/>
+          <a:p>
+            <a:r>
+              <a:rPr lang="en-US" sz="1400" dirty="0"/>
+              <a:t>CHO</a:t>
+            </a:r>
+          </a:p>
+        </p:txBody>
+      </p:sp>
       <p:pic>
         <p:nvPicPr>
-          <p:cNvPr id="21" name="Picture 20">
-            <a:extLst>
-              <a:ext uri="{FF2B5EF4-FFF2-40B4-BE49-F238E27FC236}">
-                <a16:creationId xmlns:a16="http://schemas.microsoft.com/office/drawing/2014/main" id="{62C41069-B6D7-E04C-86C7-D5FA44E218E3}"/>
+          <p:cNvPr id="16" name="Picture 15">
+            <a:extLst>
+              <a:ext uri="{FF2B5EF4-FFF2-40B4-BE49-F238E27FC236}">
+                <a16:creationId xmlns:a16="http://schemas.microsoft.com/office/drawing/2014/main" id="{BB752082-52AC-0C49-962A-3F3C3EEF6806}"/>
               </a:ext>
             </a:extLst>
           </p:cNvPr>
@@ -6777,7 +7104,7 @@
         </p:blipFill>
         <p:spPr>
           <a:xfrm>
-            <a:off x="2199186" y="3502533"/>
+            <a:off x="6137033" y="3257063"/>
             <a:ext cx="3810000" cy="2540000"/>
           </a:xfrm>
           <a:prstGeom prst="rect">
@@ -6787,10 +7114,10 @@
       </p:pic>
       <p:pic>
         <p:nvPicPr>
-          <p:cNvPr id="23" name="Picture 22">
-            <a:extLst>
-              <a:ext uri="{FF2B5EF4-FFF2-40B4-BE49-F238E27FC236}">
-                <a16:creationId xmlns:a16="http://schemas.microsoft.com/office/drawing/2014/main" id="{A493B772-A61B-4E46-9CC2-603E2AE43FC6}"/>
+          <p:cNvPr id="18" name="Picture 17">
+            <a:extLst>
+              <a:ext uri="{FF2B5EF4-FFF2-40B4-BE49-F238E27FC236}">
+                <a16:creationId xmlns:a16="http://schemas.microsoft.com/office/drawing/2014/main" id="{C5AFFB02-88AB-D340-BE42-8A8B3D11E4DB}"/>
               </a:ext>
             </a:extLst>
           </p:cNvPr>
@@ -6807,7 +7134,7 @@
         </p:blipFill>
         <p:spPr>
           <a:xfrm>
-            <a:off x="5999921" y="3455597"/>
+            <a:off x="2327032" y="3257063"/>
             <a:ext cx="3810000" cy="2540000"/>
           </a:xfrm>
           <a:prstGeom prst="rect">
@@ -6815,10 +7142,174 @@
           </a:prstGeom>
         </p:spPr>
       </p:pic>
+      <p:sp>
+        <p:nvSpPr>
+          <p:cNvPr id="19" name="TextBox 18">
+            <a:extLst>
+              <a:ext uri="{FF2B5EF4-FFF2-40B4-BE49-F238E27FC236}">
+                <a16:creationId xmlns:a16="http://schemas.microsoft.com/office/drawing/2014/main" id="{70D6C03F-6E0A-8048-A1A7-9697D447F982}"/>
+              </a:ext>
+            </a:extLst>
+          </p:cNvPr>
+          <p:cNvSpPr txBox="1"/>
+          <p:nvPr/>
+        </p:nvSpPr>
+        <p:spPr>
+          <a:xfrm rot="16200000">
+            <a:off x="1626433" y="4373174"/>
+            <a:ext cx="1043555" cy="307777"/>
+          </a:xfrm>
+          <a:prstGeom prst="rect">
+            <a:avLst/>
+          </a:prstGeom>
+          <a:noFill/>
+        </p:spPr>
+        <p:txBody>
+          <a:bodyPr wrap="none" rtlCol="0">
+            <a:spAutoFit/>
+          </a:bodyPr>
+          <a:lstStyle/>
+          <a:p>
+            <a:r>
+              <a:rPr lang="en-US" sz="1400" dirty="0"/>
+              <a:t>Xv (</a:t>
+            </a:r>
+            <a:r>
+              <a:rPr lang="en-US" sz="1400" dirty="0" err="1"/>
+              <a:t>gDW</a:t>
+            </a:r>
+            <a:r>
+              <a:rPr lang="en-US" sz="1400" dirty="0"/>
+              <a:t>/ L)</a:t>
+            </a:r>
+          </a:p>
+        </p:txBody>
+      </p:sp>
+      <p:sp>
+        <p:nvSpPr>
+          <p:cNvPr id="20" name="TextBox 19">
+            <a:extLst>
+              <a:ext uri="{FF2B5EF4-FFF2-40B4-BE49-F238E27FC236}">
+                <a16:creationId xmlns:a16="http://schemas.microsoft.com/office/drawing/2014/main" id="{43C61DF8-BC94-E64F-804C-65373D3CF80C}"/>
+              </a:ext>
+            </a:extLst>
+          </p:cNvPr>
+          <p:cNvSpPr txBox="1"/>
+          <p:nvPr/>
+        </p:nvSpPr>
+        <p:spPr>
+          <a:xfrm>
+            <a:off x="5453502" y="5797063"/>
+            <a:ext cx="1416926" cy="369332"/>
+          </a:xfrm>
+          <a:prstGeom prst="rect">
+            <a:avLst/>
+          </a:prstGeom>
+          <a:noFill/>
+        </p:spPr>
+        <p:txBody>
+          <a:bodyPr wrap="none" rtlCol="0">
+            <a:spAutoFit/>
+          </a:bodyPr>
+          <a:lstStyle/>
+          <a:p>
+            <a:r>
+              <a:rPr lang="el-GR" dirty="0"/>
+              <a:t>ξ</a:t>
+            </a:r>
+            <a:r>
+              <a:rPr lang="en-US" dirty="0"/>
+              <a:t> (</a:t>
+            </a:r>
+            <a:r>
+              <a:rPr lang="en-US" dirty="0" err="1"/>
+              <a:t>gDW</a:t>
+            </a:r>
+            <a:r>
+              <a:rPr lang="en-US" dirty="0"/>
+              <a:t> </a:t>
+            </a:r>
+            <a:r>
+              <a:rPr lang="en-US" dirty="0" err="1"/>
+              <a:t>hr</a:t>
+            </a:r>
+            <a:r>
+              <a:rPr lang="en-US" dirty="0"/>
+              <a:t>/ L)</a:t>
+            </a:r>
+          </a:p>
+        </p:txBody>
+      </p:sp>
+      <p:pic>
+        <p:nvPicPr>
+          <p:cNvPr id="39" name="Picture 38">
+            <a:extLst>
+              <a:ext uri="{FF2B5EF4-FFF2-40B4-BE49-F238E27FC236}">
+                <a16:creationId xmlns:a16="http://schemas.microsoft.com/office/drawing/2014/main" id="{71A2B2E3-038E-9E4C-B2C5-067DCB7D2F65}"/>
+              </a:ext>
+            </a:extLst>
+          </p:cNvPr>
+          <p:cNvPicPr>
+            <a:picLocks noChangeAspect="1"/>
+          </p:cNvPicPr>
+          <p:nvPr/>
+        </p:nvPicPr>
+        <p:blipFill>
+          <a:blip r:embed="rId6"/>
+          <a:stretch>
+            <a:fillRect/>
+          </a:stretch>
+        </p:blipFill>
+        <p:spPr>
+          <a:xfrm>
+            <a:off x="8663333" y="951672"/>
+            <a:ext cx="749300" cy="1257300"/>
+          </a:xfrm>
+          <a:prstGeom prst="rect">
+            <a:avLst/>
+          </a:prstGeom>
+          <a:noFill/>
+        </p:spPr>
+      </p:pic>
+      <p:sp>
+        <p:nvSpPr>
+          <p:cNvPr id="40" name="TextBox 39">
+            <a:extLst>
+              <a:ext uri="{FF2B5EF4-FFF2-40B4-BE49-F238E27FC236}">
+                <a16:creationId xmlns:a16="http://schemas.microsoft.com/office/drawing/2014/main" id="{B396D9E8-B37A-1E42-A9A7-B1FF733189E7}"/>
+              </a:ext>
+            </a:extLst>
+          </p:cNvPr>
+          <p:cNvSpPr txBox="1"/>
+          <p:nvPr/>
+        </p:nvSpPr>
+        <p:spPr>
+          <a:xfrm>
+            <a:off x="575733" y="508000"/>
+            <a:ext cx="568489" cy="369332"/>
+          </a:xfrm>
+          <a:prstGeom prst="rect">
+            <a:avLst/>
+          </a:prstGeom>
+          <a:noFill/>
+        </p:spPr>
+        <p:txBody>
+          <a:bodyPr wrap="none" rtlCol="0">
+            <a:spAutoFit/>
+          </a:bodyPr>
+          <a:lstStyle/>
+          <a:p>
+            <a:r>
+              <a:rPr lang="en-US" dirty="0"/>
+              <a:t>Low</a:t>
+            </a:r>
+          </a:p>
+        </p:txBody>
+      </p:sp>
     </p:spTree>
     <p:extLst>
       <p:ext uri="{BB962C8B-B14F-4D97-AF65-F5344CB8AC3E}">
-        <p14:creationId xmlns:p14="http://schemas.microsoft.com/office/powerpoint/2010/main" val="2467441403"/>
+        <p14:creationId xmlns:p14="http://schemas.microsoft.com/office/powerpoint/2010/main" val="489004764"/>
       </p:ext>
     </p:extLst>
   </p:cSld>
@@ -6847,10 +7338,10 @@
       </p:grpSpPr>
       <p:pic>
         <p:nvPicPr>
-          <p:cNvPr id="10" name="Picture 9">
-            <a:extLst>
-              <a:ext uri="{FF2B5EF4-FFF2-40B4-BE49-F238E27FC236}">
-                <a16:creationId xmlns:a16="http://schemas.microsoft.com/office/drawing/2014/main" id="{2A1F3903-6E4A-9C4D-8CF9-295A9E76E80E}"/>
+          <p:cNvPr id="17" name="Picture 16">
+            <a:extLst>
+              <a:ext uri="{FF2B5EF4-FFF2-40B4-BE49-F238E27FC236}">
+                <a16:creationId xmlns:a16="http://schemas.microsoft.com/office/drawing/2014/main" id="{AC505F9B-FFCD-D845-97B4-10B0FD9576C1}"/>
               </a:ext>
             </a:extLst>
           </p:cNvPr>
@@ -6867,7 +7358,7 @@
         </p:blipFill>
         <p:spPr>
           <a:xfrm>
-            <a:off x="5542721" y="1091465"/>
+            <a:off x="6009186" y="941737"/>
             <a:ext cx="3810000" cy="2540000"/>
           </a:xfrm>
           <a:prstGeom prst="rect">
@@ -6875,12 +7366,184 @@
           </a:prstGeom>
         </p:spPr>
       </p:pic>
+      <p:sp>
+        <p:nvSpPr>
+          <p:cNvPr id="8" name="TextBox 7">
+            <a:extLst>
+              <a:ext uri="{FF2B5EF4-FFF2-40B4-BE49-F238E27FC236}">
+                <a16:creationId xmlns:a16="http://schemas.microsoft.com/office/drawing/2014/main" id="{1CA84E07-5817-B442-B535-EA441BE26F02}"/>
+              </a:ext>
+            </a:extLst>
+          </p:cNvPr>
+          <p:cNvSpPr txBox="1"/>
+          <p:nvPr/>
+        </p:nvSpPr>
+        <p:spPr>
+          <a:xfrm>
+            <a:off x="3685900" y="631288"/>
+            <a:ext cx="818044" cy="307777"/>
+          </a:xfrm>
+          <a:prstGeom prst="rect">
+            <a:avLst/>
+          </a:prstGeom>
+          <a:noFill/>
+        </p:spPr>
+        <p:txBody>
+          <a:bodyPr wrap="none" rtlCol="0">
+            <a:spAutoFit/>
+          </a:bodyPr>
+          <a:lstStyle/>
+          <a:p>
+            <a:r>
+              <a:rPr lang="en-US" sz="1400" dirty="0"/>
+              <a:t>Recon3d</a:t>
+            </a:r>
+          </a:p>
+        </p:txBody>
+      </p:sp>
+      <p:sp>
+        <p:nvSpPr>
+          <p:cNvPr id="9" name="TextBox 8">
+            <a:extLst>
+              <a:ext uri="{FF2B5EF4-FFF2-40B4-BE49-F238E27FC236}">
+                <a16:creationId xmlns:a16="http://schemas.microsoft.com/office/drawing/2014/main" id="{25167EBE-19A2-4E42-A23F-CBDAF47BE8A0}"/>
+              </a:ext>
+            </a:extLst>
+          </p:cNvPr>
+          <p:cNvSpPr txBox="1"/>
+          <p:nvPr/>
+        </p:nvSpPr>
+        <p:spPr>
+          <a:xfrm>
+            <a:off x="7649082" y="631288"/>
+            <a:ext cx="511679" cy="307777"/>
+          </a:xfrm>
+          <a:prstGeom prst="rect">
+            <a:avLst/>
+          </a:prstGeom>
+          <a:noFill/>
+        </p:spPr>
+        <p:txBody>
+          <a:bodyPr wrap="none" rtlCol="0">
+            <a:spAutoFit/>
+          </a:bodyPr>
+          <a:lstStyle/>
+          <a:p>
+            <a:r>
+              <a:rPr lang="en-US" sz="1400" dirty="0"/>
+              <a:t>CHO</a:t>
+            </a:r>
+          </a:p>
+        </p:txBody>
+      </p:sp>
+      <p:sp>
+        <p:nvSpPr>
+          <p:cNvPr id="14" name="TextBox 13">
+            <a:extLst>
+              <a:ext uri="{FF2B5EF4-FFF2-40B4-BE49-F238E27FC236}">
+                <a16:creationId xmlns:a16="http://schemas.microsoft.com/office/drawing/2014/main" id="{DD945BEE-82C1-2343-8357-969737A9957B}"/>
+              </a:ext>
+            </a:extLst>
+          </p:cNvPr>
+          <p:cNvSpPr txBox="1"/>
+          <p:nvPr/>
+        </p:nvSpPr>
+        <p:spPr>
+          <a:xfrm rot="16200000">
+            <a:off x="998872" y="3325176"/>
+            <a:ext cx="1985223" cy="307777"/>
+          </a:xfrm>
+          <a:prstGeom prst="rect">
+            <a:avLst/>
+          </a:prstGeom>
+          <a:noFill/>
+        </p:spPr>
+        <p:txBody>
+          <a:bodyPr wrap="none" rtlCol="0">
+            <a:spAutoFit/>
+          </a:bodyPr>
+          <a:lstStyle/>
+          <a:p>
+            <a:r>
+              <a:rPr lang="en-US" sz="1400" dirty="0"/>
+              <a:t>Model u(mmol/ </a:t>
+            </a:r>
+            <a:r>
+              <a:rPr lang="en-US" sz="1400" dirty="0" err="1"/>
+              <a:t>gDW</a:t>
+            </a:r>
+            <a:r>
+              <a:rPr lang="en-US" sz="1400" dirty="0"/>
+              <a:t> </a:t>
+            </a:r>
+            <a:r>
+              <a:rPr lang="en-US" sz="1400" dirty="0" err="1"/>
+              <a:t>hr</a:t>
+            </a:r>
+            <a:r>
+              <a:rPr lang="en-US" sz="1400" dirty="0"/>
+              <a:t>)</a:t>
+            </a:r>
+          </a:p>
+        </p:txBody>
+      </p:sp>
+      <p:sp>
+        <p:nvSpPr>
+          <p:cNvPr id="15" name="TextBox 14">
+            <a:extLst>
+              <a:ext uri="{FF2B5EF4-FFF2-40B4-BE49-F238E27FC236}">
+                <a16:creationId xmlns:a16="http://schemas.microsoft.com/office/drawing/2014/main" id="{8C3A490E-CFA7-5245-B3CF-1C19D32566A6}"/>
+              </a:ext>
+            </a:extLst>
+          </p:cNvPr>
+          <p:cNvSpPr txBox="1"/>
+          <p:nvPr/>
+        </p:nvSpPr>
+        <p:spPr>
+          <a:xfrm>
+            <a:off x="4601392" y="6019065"/>
+            <a:ext cx="2478307" cy="307777"/>
+          </a:xfrm>
+          <a:prstGeom prst="rect">
+            <a:avLst/>
+          </a:prstGeom>
+          <a:noFill/>
+        </p:spPr>
+        <p:txBody>
+          <a:bodyPr wrap="none" rtlCol="0">
+            <a:spAutoFit/>
+          </a:bodyPr>
+          <a:lstStyle/>
+          <a:p>
+            <a:r>
+              <a:rPr lang="en-US" sz="1400" dirty="0"/>
+              <a:t>Experimental u(mmol/ </a:t>
+            </a:r>
+            <a:r>
+              <a:rPr lang="en-US" sz="1400" dirty="0" err="1"/>
+              <a:t>gDW</a:t>
+            </a:r>
+            <a:r>
+              <a:rPr lang="en-US" sz="1400" dirty="0"/>
+              <a:t> </a:t>
+            </a:r>
+            <a:r>
+              <a:rPr lang="en-US" sz="1400" dirty="0" err="1"/>
+              <a:t>hr</a:t>
+            </a:r>
+            <a:r>
+              <a:rPr lang="en-US" sz="1400" dirty="0"/>
+              <a:t>)</a:t>
+            </a:r>
+          </a:p>
+        </p:txBody>
+      </p:sp>
       <p:pic>
         <p:nvPicPr>
-          <p:cNvPr id="11" name="Picture 10">
-            <a:extLst>
-              <a:ext uri="{FF2B5EF4-FFF2-40B4-BE49-F238E27FC236}">
-                <a16:creationId xmlns:a16="http://schemas.microsoft.com/office/drawing/2014/main" id="{B3A84661-69BE-3146-ADC6-2D68D218EC82}"/>
+          <p:cNvPr id="19" name="Picture 18">
+            <a:extLst>
+              <a:ext uri="{FF2B5EF4-FFF2-40B4-BE49-F238E27FC236}">
+                <a16:creationId xmlns:a16="http://schemas.microsoft.com/office/drawing/2014/main" id="{E8DF4DF5-7BC4-5E44-90A2-5CD2C2E31702}"/>
               </a:ext>
             </a:extLst>
           </p:cNvPr>
@@ -6897,7 +7560,7 @@
         </p:blipFill>
         <p:spPr>
           <a:xfrm>
-            <a:off x="5559654" y="3665331"/>
+            <a:off x="2194554" y="952135"/>
             <a:ext cx="3810000" cy="2540000"/>
           </a:xfrm>
           <a:prstGeom prst="rect">
@@ -6907,10 +7570,10 @@
       </p:pic>
       <p:pic>
         <p:nvPicPr>
-          <p:cNvPr id="12" name="Picture 11">
-            <a:extLst>
-              <a:ext uri="{FF2B5EF4-FFF2-40B4-BE49-F238E27FC236}">
-                <a16:creationId xmlns:a16="http://schemas.microsoft.com/office/drawing/2014/main" id="{3D973950-F24B-404C-BED8-84B0FC0FB089}"/>
+          <p:cNvPr id="21" name="Picture 20">
+            <a:extLst>
+              <a:ext uri="{FF2B5EF4-FFF2-40B4-BE49-F238E27FC236}">
+                <a16:creationId xmlns:a16="http://schemas.microsoft.com/office/drawing/2014/main" id="{62C41069-B6D7-E04C-86C7-D5FA44E218E3}"/>
               </a:ext>
             </a:extLst>
           </p:cNvPr>
@@ -6927,7 +7590,7 @@
         </p:blipFill>
         <p:spPr>
           <a:xfrm>
-            <a:off x="1732721" y="3635328"/>
+            <a:off x="2199186" y="3502533"/>
             <a:ext cx="3810000" cy="2540000"/>
           </a:xfrm>
           <a:prstGeom prst="rect">
@@ -6937,10 +7600,10 @@
       </p:pic>
       <p:pic>
         <p:nvPicPr>
-          <p:cNvPr id="13" name="Picture 12">
-            <a:extLst>
-              <a:ext uri="{FF2B5EF4-FFF2-40B4-BE49-F238E27FC236}">
-                <a16:creationId xmlns:a16="http://schemas.microsoft.com/office/drawing/2014/main" id="{5F162585-E005-BF42-9400-AA9C3C65C150}"/>
+          <p:cNvPr id="23" name="Picture 22">
+            <a:extLst>
+              <a:ext uri="{FF2B5EF4-FFF2-40B4-BE49-F238E27FC236}">
+                <a16:creationId xmlns:a16="http://schemas.microsoft.com/office/drawing/2014/main" id="{A493B772-A61B-4E46-9CC2-603E2AE43FC6}"/>
               </a:ext>
             </a:extLst>
           </p:cNvPr>
@@ -6957,7 +7620,7 @@
         </p:blipFill>
         <p:spPr>
           <a:xfrm>
-            <a:off x="1732721" y="1108398"/>
+            <a:off x="5999921" y="3455597"/>
             <a:ext cx="3810000" cy="2540000"/>
           </a:xfrm>
           <a:prstGeom prst="rect">
@@ -6965,290 +7628,10 @@
           </a:prstGeom>
         </p:spPr>
       </p:pic>
-      <p:sp>
-        <p:nvSpPr>
-          <p:cNvPr id="16" name="TextBox 15">
-            <a:extLst>
-              <a:ext uri="{FF2B5EF4-FFF2-40B4-BE49-F238E27FC236}">
-                <a16:creationId xmlns:a16="http://schemas.microsoft.com/office/drawing/2014/main" id="{DFF062F2-362F-B74D-A74F-8E8B30C65CCB}"/>
-              </a:ext>
-            </a:extLst>
-          </p:cNvPr>
-          <p:cNvSpPr txBox="1"/>
-          <p:nvPr/>
-        </p:nvSpPr>
-        <p:spPr>
-          <a:xfrm>
-            <a:off x="3228700" y="800621"/>
-            <a:ext cx="818044" cy="307777"/>
-          </a:xfrm>
-          <a:prstGeom prst="rect">
-            <a:avLst/>
-          </a:prstGeom>
-          <a:noFill/>
-        </p:spPr>
-        <p:txBody>
-          <a:bodyPr wrap="none" rtlCol="0">
-            <a:spAutoFit/>
-          </a:bodyPr>
-          <a:lstStyle/>
-          <a:p>
-            <a:r>
-              <a:rPr lang="en-US" sz="1400" dirty="0"/>
-              <a:t>Recon3d</a:t>
-            </a:r>
-          </a:p>
-        </p:txBody>
-      </p:sp>
-      <p:sp>
-        <p:nvSpPr>
-          <p:cNvPr id="18" name="TextBox 17">
-            <a:extLst>
-              <a:ext uri="{FF2B5EF4-FFF2-40B4-BE49-F238E27FC236}">
-                <a16:creationId xmlns:a16="http://schemas.microsoft.com/office/drawing/2014/main" id="{18951DFB-A4DE-B14E-ABBE-8325B7DBD00F}"/>
-              </a:ext>
-            </a:extLst>
-          </p:cNvPr>
-          <p:cNvSpPr txBox="1"/>
-          <p:nvPr/>
-        </p:nvSpPr>
-        <p:spPr>
-          <a:xfrm>
-            <a:off x="7191882" y="800621"/>
-            <a:ext cx="511679" cy="307777"/>
-          </a:xfrm>
-          <a:prstGeom prst="rect">
-            <a:avLst/>
-          </a:prstGeom>
-          <a:noFill/>
-        </p:spPr>
-        <p:txBody>
-          <a:bodyPr wrap="none" rtlCol="0">
-            <a:spAutoFit/>
-          </a:bodyPr>
-          <a:lstStyle/>
-          <a:p>
-            <a:r>
-              <a:rPr lang="en-US" sz="1400" dirty="0"/>
-              <a:t>CHO</a:t>
-            </a:r>
-          </a:p>
-        </p:txBody>
-      </p:sp>
-      <p:sp>
-        <p:nvSpPr>
-          <p:cNvPr id="20" name="TextBox 19">
-            <a:extLst>
-              <a:ext uri="{FF2B5EF4-FFF2-40B4-BE49-F238E27FC236}">
-                <a16:creationId xmlns:a16="http://schemas.microsoft.com/office/drawing/2014/main" id="{991F63BB-9B93-6643-BD59-272166CC41B7}"/>
-              </a:ext>
-            </a:extLst>
-          </p:cNvPr>
-          <p:cNvSpPr txBox="1"/>
-          <p:nvPr/>
-        </p:nvSpPr>
-        <p:spPr>
-          <a:xfrm>
-            <a:off x="2001456" y="1206133"/>
-            <a:ext cx="365806" cy="307777"/>
-          </a:xfrm>
-          <a:prstGeom prst="rect">
-            <a:avLst/>
-          </a:prstGeom>
-          <a:noFill/>
-        </p:spPr>
-        <p:txBody>
-          <a:bodyPr wrap="none" rtlCol="0">
-            <a:spAutoFit/>
-          </a:bodyPr>
-          <a:lstStyle/>
-          <a:p>
-            <a:r>
-              <a:rPr lang="en-US" sz="1400" dirty="0"/>
-              <a:t>EP</a:t>
-            </a:r>
-          </a:p>
-        </p:txBody>
-      </p:sp>
-      <p:sp>
-        <p:nvSpPr>
-          <p:cNvPr id="22" name="TextBox 21">
-            <a:extLst>
-              <a:ext uri="{FF2B5EF4-FFF2-40B4-BE49-F238E27FC236}">
-                <a16:creationId xmlns:a16="http://schemas.microsoft.com/office/drawing/2014/main" id="{D17CA325-3D88-6544-8392-BB608424D804}"/>
-              </a:ext>
-            </a:extLst>
-          </p:cNvPr>
-          <p:cNvSpPr txBox="1"/>
-          <p:nvPr/>
-        </p:nvSpPr>
-        <p:spPr>
-          <a:xfrm>
-            <a:off x="1951395" y="3746133"/>
-            <a:ext cx="466666" cy="307777"/>
-          </a:xfrm>
-          <a:prstGeom prst="rect">
-            <a:avLst/>
-          </a:prstGeom>
-          <a:noFill/>
-        </p:spPr>
-        <p:txBody>
-          <a:bodyPr wrap="none" rtlCol="0">
-            <a:spAutoFit/>
-          </a:bodyPr>
-          <a:lstStyle/>
-          <a:p>
-            <a:r>
-              <a:rPr lang="en-US" sz="1400" dirty="0"/>
-              <a:t>FBA</a:t>
-            </a:r>
-          </a:p>
-        </p:txBody>
-      </p:sp>
-      <p:sp>
-        <p:nvSpPr>
-          <p:cNvPr id="24" name="TextBox 23">
-            <a:extLst>
-              <a:ext uri="{FF2B5EF4-FFF2-40B4-BE49-F238E27FC236}">
-                <a16:creationId xmlns:a16="http://schemas.microsoft.com/office/drawing/2014/main" id="{519026D8-7EBC-5049-B81B-882B55602753}"/>
-              </a:ext>
-            </a:extLst>
-          </p:cNvPr>
-          <p:cNvSpPr txBox="1"/>
-          <p:nvPr/>
-        </p:nvSpPr>
-        <p:spPr>
-          <a:xfrm>
-            <a:off x="5862256" y="1189200"/>
-            <a:ext cx="365806" cy="307777"/>
-          </a:xfrm>
-          <a:prstGeom prst="rect">
-            <a:avLst/>
-          </a:prstGeom>
-          <a:noFill/>
-        </p:spPr>
-        <p:txBody>
-          <a:bodyPr wrap="none" rtlCol="0">
-            <a:spAutoFit/>
-          </a:bodyPr>
-          <a:lstStyle/>
-          <a:p>
-            <a:r>
-              <a:rPr lang="en-US" sz="1400" dirty="0"/>
-              <a:t>EP</a:t>
-            </a:r>
-          </a:p>
-        </p:txBody>
-      </p:sp>
-      <p:sp>
-        <p:nvSpPr>
-          <p:cNvPr id="25" name="TextBox 24">
-            <a:extLst>
-              <a:ext uri="{FF2B5EF4-FFF2-40B4-BE49-F238E27FC236}">
-                <a16:creationId xmlns:a16="http://schemas.microsoft.com/office/drawing/2014/main" id="{373A200C-0F88-5F4C-AC8A-E48AC14DE0E2}"/>
-              </a:ext>
-            </a:extLst>
-          </p:cNvPr>
-          <p:cNvSpPr txBox="1"/>
-          <p:nvPr/>
-        </p:nvSpPr>
-        <p:spPr>
-          <a:xfrm>
-            <a:off x="5862256" y="3746133"/>
-            <a:ext cx="466666" cy="307777"/>
-          </a:xfrm>
-          <a:prstGeom prst="rect">
-            <a:avLst/>
-          </a:prstGeom>
-          <a:noFill/>
-        </p:spPr>
-        <p:txBody>
-          <a:bodyPr wrap="none" rtlCol="0">
-            <a:spAutoFit/>
-          </a:bodyPr>
-          <a:lstStyle/>
-          <a:p>
-            <a:r>
-              <a:rPr lang="en-US" sz="1400" dirty="0"/>
-              <a:t>FBA</a:t>
-            </a:r>
-          </a:p>
-        </p:txBody>
-      </p:sp>
-      <p:sp>
-        <p:nvSpPr>
-          <p:cNvPr id="26" name="TextBox 25">
-            <a:extLst>
-              <a:ext uri="{FF2B5EF4-FFF2-40B4-BE49-F238E27FC236}">
-                <a16:creationId xmlns:a16="http://schemas.microsoft.com/office/drawing/2014/main" id="{2822D5A9-DAB1-D641-803E-E408146D863A}"/>
-              </a:ext>
-            </a:extLst>
-          </p:cNvPr>
-          <p:cNvSpPr txBox="1"/>
-          <p:nvPr/>
-        </p:nvSpPr>
-        <p:spPr>
-          <a:xfrm rot="16200000">
-            <a:off x="1204704" y="3262667"/>
-            <a:ext cx="659155" cy="307777"/>
-          </a:xfrm>
-          <a:prstGeom prst="rect">
-            <a:avLst/>
-          </a:prstGeom>
-          <a:noFill/>
-        </p:spPr>
-        <p:txBody>
-          <a:bodyPr wrap="none" rtlCol="0">
-            <a:spAutoFit/>
-          </a:bodyPr>
-          <a:lstStyle/>
-          <a:p>
-            <a:r>
-              <a:rPr lang="en-US" sz="1400" dirty="0"/>
-              <a:t>Model</a:t>
-            </a:r>
-          </a:p>
-        </p:txBody>
-      </p:sp>
-      <p:sp>
-        <p:nvSpPr>
-          <p:cNvPr id="27" name="TextBox 26">
-            <a:extLst>
-              <a:ext uri="{FF2B5EF4-FFF2-40B4-BE49-F238E27FC236}">
-                <a16:creationId xmlns:a16="http://schemas.microsoft.com/office/drawing/2014/main" id="{F1117BAC-3381-C844-90E8-7DECE36A2C0D}"/>
-              </a:ext>
-            </a:extLst>
-          </p:cNvPr>
-          <p:cNvSpPr txBox="1"/>
-          <p:nvPr/>
-        </p:nvSpPr>
-        <p:spPr>
-          <a:xfrm>
-            <a:off x="4836078" y="6175328"/>
-            <a:ext cx="1026178" cy="307777"/>
-          </a:xfrm>
-          <a:prstGeom prst="rect">
-            <a:avLst/>
-          </a:prstGeom>
-          <a:noFill/>
-        </p:spPr>
-        <p:txBody>
-          <a:bodyPr wrap="none" rtlCol="0">
-            <a:spAutoFit/>
-          </a:bodyPr>
-          <a:lstStyle/>
-          <a:p>
-            <a:r>
-              <a:rPr lang="en-US" sz="1400" dirty="0"/>
-              <a:t>Experiment</a:t>
-            </a:r>
-          </a:p>
-        </p:txBody>
-      </p:sp>
     </p:spTree>
     <p:extLst>
       <p:ext uri="{BB962C8B-B14F-4D97-AF65-F5344CB8AC3E}">
-        <p14:creationId xmlns:p14="http://schemas.microsoft.com/office/powerpoint/2010/main" val="3874926511"/>
+        <p14:creationId xmlns:p14="http://schemas.microsoft.com/office/powerpoint/2010/main" val="2467441403"/>
       </p:ext>
     </p:extLst>
   </p:cSld>

</xml_diff>